<commit_message>
Added Lec09 and Updated Lec08
</commit_message>
<xml_diff>
--- a/Syllabus/Lecture08/Lec08.pptx
+++ b/Syllabus/Lecture08/Lec08.pptx
@@ -5,10 +5,10 @@
     <p:sldMasterId id="2147483664" r:id="rId1"/>
   </p:sldMasterIdLst>
   <p:notesMasterIdLst>
-    <p:notesMasterId r:id="rId42"/>
+    <p:notesMasterId r:id="rId41"/>
   </p:notesMasterIdLst>
   <p:handoutMasterIdLst>
-    <p:handoutMasterId r:id="rId43"/>
+    <p:handoutMasterId r:id="rId42"/>
   </p:handoutMasterIdLst>
   <p:sldIdLst>
     <p:sldId id="266" r:id="rId2"/>
@@ -44,13 +44,12 @@
     <p:sldId id="1082" r:id="rId32"/>
     <p:sldId id="1092" r:id="rId33"/>
     <p:sldId id="1093" r:id="rId34"/>
-    <p:sldId id="1083" r:id="rId35"/>
-    <p:sldId id="1084" r:id="rId36"/>
-    <p:sldId id="1094" r:id="rId37"/>
-    <p:sldId id="1087" r:id="rId38"/>
-    <p:sldId id="1088" r:id="rId39"/>
-    <p:sldId id="1089" r:id="rId40"/>
-    <p:sldId id="1091" r:id="rId41"/>
+    <p:sldId id="1096" r:id="rId35"/>
+    <p:sldId id="1097" r:id="rId36"/>
+    <p:sldId id="1098" r:id="rId37"/>
+    <p:sldId id="1091" r:id="rId38"/>
+    <p:sldId id="1100" r:id="rId39"/>
+    <p:sldId id="1101" r:id="rId40"/>
   </p:sldIdLst>
   <p:sldSz cx="12192000" cy="6858000"/>
   <p:notesSz cx="6858000" cy="9144000"/>
@@ -187,13 +186,12 @@
             <p14:sldId id="1082"/>
             <p14:sldId id="1092"/>
             <p14:sldId id="1093"/>
-            <p14:sldId id="1083"/>
-            <p14:sldId id="1084"/>
-            <p14:sldId id="1094"/>
-            <p14:sldId id="1087"/>
-            <p14:sldId id="1088"/>
-            <p14:sldId id="1089"/>
+            <p14:sldId id="1096"/>
+            <p14:sldId id="1097"/>
+            <p14:sldId id="1098"/>
             <p14:sldId id="1091"/>
+            <p14:sldId id="1100"/>
+            <p14:sldId id="1101"/>
           </p14:sldIdLst>
         </p14:section>
       </p14:sectionLst>
@@ -313,7 +311,7 @@
           <a:p>
             <a:fld id="{DF9C6931-D0F6-AB40-9D7F-95567148A5C2}" type="datetimeFigureOut">
               <a:rPr lang="en-US" smtClean="0"/>
-              <a:t>10/17/23</a:t>
+              <a:t>10/19/23</a:t>
             </a:fld>
             <a:endParaRPr lang="en-US"/>
           </a:p>
@@ -808,7 +806,7 @@
           <a:p>
             <a:fld id="{736C18F2-6801-5147-A332-A6E1C7D69D18}" type="datetimeFigureOut">
               <a:rPr lang="en-US" smtClean="0"/>
-              <a:t>10/17/23</a:t>
+              <a:t>10/19/23</a:t>
             </a:fld>
             <a:endParaRPr lang="en-US"/>
           </a:p>
@@ -4492,7 +4490,7 @@
     </p:spTree>
     <p:extLst>
       <p:ext uri="{BB962C8B-B14F-4D97-AF65-F5344CB8AC3E}">
-        <p14:creationId xmlns:p14="http://schemas.microsoft.com/office/powerpoint/2010/main" val="2899505075"/>
+        <p14:creationId xmlns:p14="http://schemas.microsoft.com/office/powerpoint/2010/main" val="1523413344"/>
       </p:ext>
     </p:extLst>
   </p:cSld>
@@ -4621,7 +4619,7 @@
     </p:spTree>
     <p:extLst>
       <p:ext uri="{BB962C8B-B14F-4D97-AF65-F5344CB8AC3E}">
-        <p14:creationId xmlns:p14="http://schemas.microsoft.com/office/powerpoint/2010/main" val="1014871254"/>
+        <p14:creationId xmlns:p14="http://schemas.microsoft.com/office/powerpoint/2010/main" val="4076735397"/>
       </p:ext>
     </p:extLst>
   </p:cSld>
@@ -4750,7 +4748,7 @@
     </p:spTree>
     <p:extLst>
       <p:ext uri="{BB962C8B-B14F-4D97-AF65-F5344CB8AC3E}">
-        <p14:creationId xmlns:p14="http://schemas.microsoft.com/office/powerpoint/2010/main" val="2146563682"/>
+        <p14:creationId xmlns:p14="http://schemas.microsoft.com/office/powerpoint/2010/main" val="407960410"/>
       </p:ext>
     </p:extLst>
   </p:cSld>
@@ -4879,7 +4877,7 @@
     </p:spTree>
     <p:extLst>
       <p:ext uri="{BB962C8B-B14F-4D97-AF65-F5344CB8AC3E}">
-        <p14:creationId xmlns:p14="http://schemas.microsoft.com/office/powerpoint/2010/main" val="1821646306"/>
+        <p14:creationId xmlns:p14="http://schemas.microsoft.com/office/powerpoint/2010/main" val="3005836388"/>
       </p:ext>
     </p:extLst>
   </p:cSld>
@@ -5008,7 +5006,7 @@
     </p:spTree>
     <p:extLst>
       <p:ext uri="{BB962C8B-B14F-4D97-AF65-F5344CB8AC3E}">
-        <p14:creationId xmlns:p14="http://schemas.microsoft.com/office/powerpoint/2010/main" val="3112029055"/>
+        <p14:creationId xmlns:p14="http://schemas.microsoft.com/office/powerpoint/2010/main" val="3969159110"/>
       </p:ext>
     </p:extLst>
   </p:cSld>
@@ -5137,136 +5135,7 @@
     </p:spTree>
     <p:extLst>
       <p:ext uri="{BB962C8B-B14F-4D97-AF65-F5344CB8AC3E}">
-        <p14:creationId xmlns:p14="http://schemas.microsoft.com/office/powerpoint/2010/main" val="208792149"/>
-      </p:ext>
-    </p:extLst>
-  </p:cSld>
-  <p:clrMapOvr>
-    <a:masterClrMapping/>
-  </p:clrMapOvr>
-</p:notes>
-</file>
-
-<file path=ppt/notesSlides/notesSlide39.xml><?xml version="1.0" encoding="utf-8"?>
-<p:notes xmlns:a="http://schemas.openxmlformats.org/drawingml/2006/main" xmlns:r="http://schemas.openxmlformats.org/officeDocument/2006/relationships" xmlns:p="http://schemas.openxmlformats.org/presentationml/2006/main" showMasterSp="0" showMasterPhAnim="0">
-  <p:cSld>
-    <p:spTree>
-      <p:nvGrpSpPr>
-        <p:cNvPr id="1" name="Shape 91"/>
-        <p:cNvGrpSpPr/>
-        <p:nvPr/>
-      </p:nvGrpSpPr>
-      <p:grpSpPr>
-        <a:xfrm>
-          <a:off x="0" y="0"/>
-          <a:ext cx="0" cy="0"/>
-          <a:chOff x="0" y="0"/>
-          <a:chExt cx="0" cy="0"/>
-        </a:xfrm>
-      </p:grpSpPr>
-      <p:sp>
-        <p:nvSpPr>
-          <p:cNvPr id="92" name="Google Shape;92;g921be16503_9_0:notes"/>
-          <p:cNvSpPr>
-            <a:spLocks noGrp="1" noRot="1" noChangeAspect="1"/>
-          </p:cNvSpPr>
-          <p:nvPr>
-            <p:ph type="sldImg" idx="2"/>
-          </p:nvPr>
-        </p:nvSpPr>
-        <p:spPr>
-          <a:xfrm>
-            <a:off x="381000" y="685800"/>
-            <a:ext cx="6096000" cy="3429000"/>
-          </a:xfrm>
-          <a:custGeom>
-            <a:avLst/>
-            <a:gdLst/>
-            <a:ahLst/>
-            <a:cxnLst/>
-            <a:rect l="l" t="t" r="r" b="b"/>
-            <a:pathLst>
-              <a:path w="120000" h="120000" extrusionOk="0">
-                <a:moveTo>
-                  <a:pt x="0" y="0"/>
-                </a:moveTo>
-                <a:lnTo>
-                  <a:pt x="120000" y="0"/>
-                </a:lnTo>
-                <a:lnTo>
-                  <a:pt x="120000" y="120000"/>
-                </a:lnTo>
-                <a:lnTo>
-                  <a:pt x="0" y="120000"/>
-                </a:lnTo>
-                <a:close/>
-              </a:path>
-            </a:pathLst>
-          </a:custGeom>
-        </p:spPr>
-      </p:sp>
-      <p:sp>
-        <p:nvSpPr>
-          <p:cNvPr id="93" name="Google Shape;93;g921be16503_9_0:notes"/>
-          <p:cNvSpPr txBox="1">
-            <a:spLocks noGrp="1"/>
-          </p:cNvSpPr>
-          <p:nvPr>
-            <p:ph type="body" idx="1"/>
-          </p:nvPr>
-        </p:nvSpPr>
-        <p:spPr>
-          <a:xfrm>
-            <a:off x="685800" y="4343400"/>
-            <a:ext cx="5486400" cy="4114800"/>
-          </a:xfrm>
-          <a:prstGeom prst="rect">
-            <a:avLst/>
-          </a:prstGeom>
-        </p:spPr>
-        <p:txBody>
-          <a:bodyPr spcFirstLastPara="1" wrap="square" lIns="91425" tIns="91425" rIns="91425" bIns="91425" anchor="t" anchorCtr="0">
-            <a:noAutofit/>
-          </a:bodyPr>
-          <a:lstStyle/>
-          <a:p>
-            <a:pPr marL="0" marR="0" lvl="0" indent="0" algn="l" defTabSz="609585" rtl="0" eaLnBrk="1" fontAlgn="auto" latinLnBrk="0" hangingPunct="1">
-              <a:lnSpc>
-                <a:spcPct val="100000"/>
-              </a:lnSpc>
-              <a:spcBef>
-                <a:spcPts val="0"/>
-              </a:spcBef>
-              <a:spcAft>
-                <a:spcPts val="0"/>
-              </a:spcAft>
-              <a:buClrTx/>
-              <a:buSzTx/>
-              <a:buFontTx/>
-              <a:buNone/>
-              <a:tabLst/>
-              <a:defRPr/>
-            </a:pPr>
-            <a:endParaRPr lang="en-US" altLang="en-US" dirty="0"/>
-          </a:p>
-          <a:p>
-            <a:pPr marL="0" lvl="0" indent="0" algn="l" rtl="0">
-              <a:spcBef>
-                <a:spcPts val="0"/>
-              </a:spcBef>
-              <a:spcAft>
-                <a:spcPts val="0"/>
-              </a:spcAft>
-              <a:buNone/>
-            </a:pPr>
-            <a:endParaRPr lang="en-US" dirty="0"/>
-          </a:p>
-        </p:txBody>
-      </p:sp>
-    </p:spTree>
-    <p:extLst>
-      <p:ext uri="{BB962C8B-B14F-4D97-AF65-F5344CB8AC3E}">
-        <p14:creationId xmlns:p14="http://schemas.microsoft.com/office/powerpoint/2010/main" val="3005836388"/>
+        <p14:creationId xmlns:p14="http://schemas.microsoft.com/office/powerpoint/2010/main" val="121613774"/>
       </p:ext>
     </p:extLst>
   </p:cSld>
@@ -20820,7 +20689,7 @@
         <p:spPr>
           <a:xfrm>
             <a:off x="1000988" y="1484930"/>
-            <a:ext cx="9715220" cy="4416594"/>
+            <a:ext cx="9715220" cy="4862870"/>
           </a:xfrm>
           <a:prstGeom prst="rect">
             <a:avLst/>
@@ -20833,7 +20702,7 @@
           </a:bodyPr>
           <a:lstStyle/>
           <a:p>
-            <a:pPr marL="609585" lvl="0" indent="-507987">
+            <a:pPr marL="101598" lvl="0">
               <a:spcBef>
                 <a:spcPts val="640"/>
               </a:spcBef>
@@ -20841,8 +20710,6 @@
                 <a:srgbClr val="000000"/>
               </a:buClr>
               <a:buSzPts val="2400"/>
-              <a:buFont typeface="Arial"/>
-              <a:buChar char="•"/>
             </a:pPr>
             <a:r>
               <a:rPr lang="en-US" altLang="en-US" sz="3200" dirty="0">
@@ -20852,7 +20719,7 @@
                 <a:cs typeface="Arial"/>
                 <a:sym typeface="Arial"/>
               </a:rPr>
-              <a:t>Most distance measures were designed for linear/real-valued attributes</a:t>
+              <a:t>1. Most distance measures were designed for linear/real-valued attributes</a:t>
             </a:r>
           </a:p>
           <a:p>
@@ -20917,6 +20784,29 @@
                 <a:sym typeface="Arial"/>
               </a:rPr>
               <a:t>How best to handle nominal attributes</a:t>
+            </a:r>
+          </a:p>
+          <a:p>
+            <a:pPr marL="1828755" lvl="2" indent="-507987">
+              <a:spcBef>
+                <a:spcPts val="640"/>
+              </a:spcBef>
+              <a:buClr>
+                <a:srgbClr val="000000"/>
+              </a:buClr>
+              <a:buSzPts val="2400"/>
+              <a:buFont typeface="Arial"/>
+              <a:buChar char="–"/>
+            </a:pPr>
+            <a:r>
+              <a:rPr lang="en-US" altLang="en-US" dirty="0">
+                <a:solidFill>
+                  <a:srgbClr val="000000"/>
+                </a:solidFill>
+                <a:cs typeface="Arial"/>
+                <a:sym typeface="Arial"/>
+              </a:rPr>
+              <a:t>also called categorical, non-ordinal, non-numeric.</a:t>
             </a:r>
           </a:p>
           <a:p>
@@ -21187,6 +21077,37 @@
                                   </p:childTnLst>
                                 </p:cTn>
                               </p:par>
+                              <p:par>
+                                <p:cTn id="15" presetID="1" presetClass="entr" presetSubtype="0" fill="hold" nodeType="withEffect">
+                                  <p:stCondLst>
+                                    <p:cond delay="0"/>
+                                  </p:stCondLst>
+                                  <p:childTnLst>
+                                    <p:set>
+                                      <p:cBhvr>
+                                        <p:cTn id="16" dur="1" fill="hold">
+                                          <p:stCondLst>
+                                            <p:cond delay="0"/>
+                                          </p:stCondLst>
+                                        </p:cTn>
+                                        <p:tgtEl>
+                                          <p:spTgt spid="2">
+                                            <p:txEl>
+                                              <p:pRg st="5" end="5"/>
+                                            </p:txEl>
+                                          </p:spTgt>
+                                        </p:tgtEl>
+                                        <p:attrNameLst>
+                                          <p:attrName>style.visibility</p:attrName>
+                                        </p:attrNameLst>
+                                      </p:cBhvr>
+                                      <p:to>
+                                        <p:strVal val="visible"/>
+                                      </p:to>
+                                    </p:set>
+                                  </p:childTnLst>
+                                </p:cTn>
+                              </p:par>
                             </p:childTnLst>
                           </p:cTn>
                         </p:par>
@@ -21291,7 +21212,7 @@
         <p:spPr>
           <a:xfrm>
             <a:off x="804672" y="1786999"/>
-            <a:ext cx="10816080" cy="4031873"/>
+            <a:ext cx="10816080" cy="4524315"/>
           </a:xfrm>
           <a:prstGeom prst="rect">
             <a:avLst/>
@@ -21306,7 +21227,7 @@
           <a:p>
             <a:r>
               <a:rPr lang="en-US" altLang="en-US" sz="3200" dirty="0"/>
-              <a:t>Different features may have different measurement scales</a:t>
+              <a:t>2. Different features may have different measurement scales</a:t>
             </a:r>
           </a:p>
           <a:p>
@@ -21409,7 +21330,7 @@
                   <a:srgbClr val="E46102"/>
                 </a:solidFill>
               </a:rPr>
-              <a:t>Other distance measures</a:t>
+              <a:t>Solution: Use Other distance measures</a:t>
             </a:r>
             <a:endParaRPr sz="4000" b="1" dirty="0">
               <a:solidFill>
@@ -21720,8 +21641,8 @@
         </p:nvSpPr>
         <p:spPr>
           <a:xfrm>
-            <a:off x="9096973" y="1307643"/>
-            <a:ext cx="2416782" cy="830997"/>
+            <a:off x="9503479" y="1969286"/>
+            <a:ext cx="1491779" cy="646331"/>
           </a:xfrm>
           <a:prstGeom prst="rect">
             <a:avLst/>
@@ -21739,8 +21660,9 @@
           </a:bodyPr>
           <a:lstStyle/>
           <a:p>
-            <a:r>
-              <a:rPr lang="en-US" b="1" dirty="0"/>
+            <a:pPr algn="ctr"/>
+            <a:r>
+              <a:rPr lang="en-US" sz="1800" b="1" dirty="0"/>
               <a:t>Measuring “nearest”</a:t>
             </a:r>
           </a:p>
@@ -21760,8 +21682,8 @@
         </p:nvSpPr>
         <p:spPr>
           <a:xfrm>
-            <a:off x="982327" y="1527609"/>
-            <a:ext cx="7806363" cy="4524315"/>
+            <a:off x="1005682" y="1723141"/>
+            <a:ext cx="6959971" cy="4093428"/>
           </a:xfrm>
           <a:prstGeom prst="rect">
             <a:avLst/>
@@ -21779,7 +21701,7 @@
               <a:buChar char="•"/>
             </a:pPr>
             <a:r>
-              <a:rPr lang="en-US" dirty="0"/>
+              <a:rPr lang="en-US" sz="2000" dirty="0"/>
               <a:t>Binary-valued features</a:t>
             </a:r>
           </a:p>
@@ -21789,55 +21711,55 @@
               <a:buChar char="•"/>
             </a:pPr>
             <a:r>
-              <a:rPr lang="en-US" dirty="0"/>
+              <a:rPr lang="en-US" sz="2000" dirty="0"/>
               <a:t>Hamming distance </a:t>
             </a:r>
             <a:r>
-              <a:rPr lang="en-US" i="1" dirty="0"/>
+              <a:rPr lang="en-US" sz="2000" i="1" dirty="0"/>
               <a:t>dist(</a:t>
             </a:r>
             <a:r>
-              <a:rPr lang="en-US" b="1" i="1" dirty="0" err="1"/>
+              <a:rPr lang="en-US" sz="2000" b="1" i="1" dirty="0" err="1"/>
               <a:t>a,b</a:t>
             </a:r>
             <a:r>
-              <a:rPr lang="en-US" i="1" dirty="0"/>
+              <a:rPr lang="en-US" sz="2000" i="1" dirty="0"/>
               <a:t>)</a:t>
             </a:r>
             <a:r>
-              <a:rPr lang="en-US" dirty="0"/>
+              <a:rPr lang="en-US" sz="2000" dirty="0"/>
               <a:t> = </a:t>
             </a:r>
             <a:r>
-              <a:rPr lang="el-GR" dirty="0"/>
+              <a:rPr lang="el-GR" sz="2000" dirty="0"/>
               <a:t>Σ</a:t>
             </a:r>
             <a:r>
-              <a:rPr lang="en-US" i="1" baseline="-25000" dirty="0" err="1"/>
+              <a:rPr lang="en-US" sz="2000" i="1" baseline="-25000" dirty="0" err="1"/>
               <a:t>i</a:t>
             </a:r>
             <a:r>
-              <a:rPr lang="en-US" i="1" baseline="-25000" dirty="0"/>
+              <a:rPr lang="en-US" sz="2000" i="1" baseline="-25000" dirty="0"/>
               <a:t> </a:t>
             </a:r>
             <a:r>
-              <a:rPr lang="it-IT" i="1" dirty="0"/>
+              <a:rPr lang="it-IT" sz="2000" i="1" dirty="0"/>
               <a:t>I(a</a:t>
             </a:r>
             <a:r>
-              <a:rPr lang="it-IT" i="1" baseline="-25000" dirty="0"/>
+              <a:rPr lang="it-IT" sz="2000" i="1" baseline="-25000" dirty="0"/>
               <a:t>i</a:t>
             </a:r>
             <a:r>
-              <a:rPr lang="it-IT" i="1" dirty="0"/>
+              <a:rPr lang="it-IT" sz="2000" i="1" dirty="0"/>
               <a:t> ≠ b</a:t>
             </a:r>
             <a:r>
-              <a:rPr lang="it-IT" i="1" baseline="-25000" dirty="0"/>
+              <a:rPr lang="it-IT" sz="2000" i="1" baseline="-25000" dirty="0"/>
               <a:t>i</a:t>
             </a:r>
             <a:r>
-              <a:rPr lang="it-IT" i="1" dirty="0"/>
+              <a:rPr lang="it-IT" sz="2000" i="1" dirty="0"/>
               <a:t>)</a:t>
             </a:r>
           </a:p>
@@ -21847,16 +21769,20 @@
               <a:buChar char="•"/>
             </a:pPr>
             <a:r>
-              <a:rPr lang="en-US" dirty="0"/>
+              <a:rPr lang="en-US" sz="2000" dirty="0"/>
               <a:t>Counts number of features where two examples disagree</a:t>
             </a:r>
+          </a:p>
+          <a:p>
+            <a:pPr lvl="1"/>
+            <a:endParaRPr lang="en-US" sz="2000" dirty="0"/>
           </a:p>
           <a:p>
             <a:pPr marL="342900" indent="-342900">
               <a:buFont typeface="Arial" panose="020B0604020202020204" pitchFamily="34" charset="0"/>
               <a:buChar char="•"/>
             </a:pPr>
-            <a:endParaRPr lang="en-US" dirty="0"/>
+            <a:endParaRPr lang="en-US" sz="2000" dirty="0"/>
           </a:p>
           <a:p>
             <a:pPr marL="342900" indent="-342900">
@@ -21864,7 +21790,7 @@
               <a:buChar char="•"/>
             </a:pPr>
             <a:r>
-              <a:rPr lang="en-US" dirty="0"/>
+              <a:rPr lang="en-US" sz="2000" dirty="0"/>
               <a:t>Mixed feature types (some real, some binary, some nominal)</a:t>
             </a:r>
           </a:p>
@@ -21874,7 +21800,7 @@
               <a:buChar char="•"/>
             </a:pPr>
             <a:r>
-              <a:rPr lang="en-US" dirty="0"/>
+              <a:rPr lang="en-US" sz="2000" dirty="0"/>
               <a:t>Mixed distance measures</a:t>
             </a:r>
           </a:p>
@@ -21884,7 +21810,7 @@
               <a:buChar char="•"/>
             </a:pPr>
             <a:r>
-              <a:rPr lang="en-US" dirty="0"/>
+              <a:rPr lang="en-US" sz="2000" dirty="0"/>
               <a:t>E.g. Euclidean for real part, hamming for binary</a:t>
             </a:r>
           </a:p>
@@ -21893,7 +21819,7 @@
               <a:buFont typeface="Arial" panose="020B0604020202020204" pitchFamily="34" charset="0"/>
               <a:buChar char="•"/>
             </a:pPr>
-            <a:endParaRPr lang="en-US" dirty="0"/>
+            <a:endParaRPr lang="en-US" sz="2000" dirty="0"/>
           </a:p>
           <a:p>
             <a:pPr marL="342900" indent="-342900">
@@ -21901,75 +21827,125 @@
               <a:buChar char="•"/>
             </a:pPr>
             <a:r>
-              <a:rPr lang="en-US" dirty="0"/>
+              <a:rPr lang="en-US" sz="2000" dirty="0"/>
               <a:t>Can also assign weights to features</a:t>
             </a:r>
           </a:p>
           <a:p>
             <a:r>
-              <a:rPr lang="en-US" dirty="0"/>
+              <a:rPr lang="en-US" sz="2000" dirty="0"/>
               <a:t>	</a:t>
             </a:r>
             <a:r>
-              <a:rPr lang="en-US" i="1" dirty="0"/>
+              <a:rPr lang="en-US" sz="2000" i="1" dirty="0"/>
               <a:t>dist(</a:t>
             </a:r>
             <a:r>
-              <a:rPr lang="en-US" b="1" i="1" dirty="0" err="1"/>
+              <a:rPr lang="en-US" sz="2000" b="1" i="1" dirty="0" err="1"/>
               <a:t>a,b</a:t>
             </a:r>
             <a:r>
-              <a:rPr lang="en-US" i="1" dirty="0"/>
+              <a:rPr lang="en-US" sz="2000" i="1" dirty="0"/>
               <a:t>)</a:t>
             </a:r>
             <a:r>
-              <a:rPr lang="en-US" dirty="0"/>
+              <a:rPr lang="en-US" sz="2000" dirty="0"/>
               <a:t> = </a:t>
             </a:r>
             <a:r>
-              <a:rPr lang="el-GR" dirty="0"/>
+              <a:rPr lang="el-GR" sz="2000" dirty="0"/>
               <a:t>Σ</a:t>
             </a:r>
             <a:r>
-              <a:rPr lang="en-US" i="1" baseline="-25000" dirty="0" err="1"/>
+              <a:rPr lang="en-US" sz="2000" i="1" baseline="-25000" dirty="0" err="1"/>
               <a:t>i</a:t>
             </a:r>
             <a:r>
-              <a:rPr lang="en-US" i="1" baseline="-25000" dirty="0"/>
+              <a:rPr lang="en-US" sz="2000" i="1" baseline="-25000" dirty="0"/>
               <a:t> </a:t>
             </a:r>
             <a:r>
-              <a:rPr lang="it-IT" i="1" dirty="0"/>
+              <a:rPr lang="it-IT" sz="2000" i="1" dirty="0"/>
               <a:t>w</a:t>
             </a:r>
             <a:r>
-              <a:rPr lang="it-IT" i="1" baseline="-25000" dirty="0"/>
+              <a:rPr lang="it-IT" sz="2000" i="1" baseline="-25000" dirty="0"/>
               <a:t>i</a:t>
             </a:r>
             <a:r>
-              <a:rPr lang="it-IT" i="1" dirty="0"/>
+              <a:rPr lang="it-IT" sz="2000" i="1" dirty="0"/>
               <a:t> .d(a</a:t>
             </a:r>
             <a:r>
-              <a:rPr lang="it-IT" i="1" baseline="-25000" dirty="0"/>
+              <a:rPr lang="it-IT" sz="2000" i="1" baseline="-25000" dirty="0"/>
               <a:t>i</a:t>
             </a:r>
             <a:r>
-              <a:rPr lang="it-IT" i="1" dirty="0"/>
+              <a:rPr lang="it-IT" sz="2000" i="1" dirty="0"/>
               <a:t> ,b</a:t>
             </a:r>
             <a:r>
-              <a:rPr lang="it-IT" i="1" baseline="-25000" dirty="0"/>
+              <a:rPr lang="it-IT" sz="2000" i="1" baseline="-25000" dirty="0"/>
               <a:t>i</a:t>
             </a:r>
             <a:r>
-              <a:rPr lang="it-IT" i="1" dirty="0"/>
+              <a:rPr lang="it-IT" sz="2000" i="1" dirty="0"/>
               <a:t>)</a:t>
             </a:r>
-            <a:endParaRPr lang="en-US" dirty="0"/>
+            <a:endParaRPr lang="en-US" sz="2000" dirty="0"/>
           </a:p>
         </p:txBody>
       </p:sp>
+      <p:pic>
+        <p:nvPicPr>
+          <p:cNvPr id="1026" name="Picture 2">
+            <a:extLst>
+              <a:ext uri="{FF2B5EF4-FFF2-40B4-BE49-F238E27FC236}">
+                <a16:creationId xmlns:a16="http://schemas.microsoft.com/office/drawing/2014/main" id="{2EC020B5-D305-C955-49BC-EE9881676162}"/>
+              </a:ext>
+            </a:extLst>
+          </p:cNvPr>
+          <p:cNvPicPr>
+            <a:picLocks noChangeAspect="1" noChangeArrowheads="1"/>
+          </p:cNvPicPr>
+          <p:nvPr/>
+        </p:nvPicPr>
+        <p:blipFill rotWithShape="1">
+          <a:blip r:embed="rId3">
+            <a:extLst>
+              <a:ext uri="{28A0092B-C50C-407E-A947-70E740481C1C}">
+                <a14:useLocalDpi xmlns:a14="http://schemas.microsoft.com/office/drawing/2010/main" val="0"/>
+              </a:ext>
+            </a:extLst>
+          </a:blip>
+          <a:srcRect l="5524" t="6245" r="5771" b="7241"/>
+          <a:stretch/>
+        </p:blipFill>
+        <p:spPr bwMode="auto">
+          <a:xfrm>
+            <a:off x="7965653" y="3712887"/>
+            <a:ext cx="3880431" cy="2623121"/>
+          </a:xfrm>
+          <a:prstGeom prst="rect">
+            <a:avLst/>
+          </a:prstGeom>
+          <a:noFill/>
+          <a:ln>
+            <a:solidFill>
+              <a:schemeClr val="tx1"/>
+            </a:solidFill>
+          </a:ln>
+          <a:extLst>
+            <a:ext uri="{909E8E84-426E-40DD-AFC4-6F175D3DCCD1}">
+              <a14:hiddenFill xmlns:a14="http://schemas.microsoft.com/office/drawing/2010/main">
+                <a:solidFill>
+                  <a:srgbClr val="FFFFFF"/>
+                </a:solidFill>
+              </a14:hiddenFill>
+            </a:ext>
+          </a:extLst>
+        </p:spPr>
+      </p:pic>
     </p:spTree>
     <p:extLst>
       <p:ext uri="{BB962C8B-B14F-4D97-AF65-F5344CB8AC3E}">
@@ -23362,7 +23338,15 @@
             </a:r>
             <a:r>
               <a:rPr lang="en-US" dirty="0"/>
-              <a:t> are prediction errors </a:t>
+              <a:t> are </a:t>
+            </a:r>
+            <a:r>
+              <a:rPr lang="en-US" b="1" dirty="0">
+                <a:solidFill>
+                  <a:schemeClr val="accent1"/>
+                </a:solidFill>
+              </a:rPr>
+              <a:t>prediction errors </a:t>
             </a:r>
           </a:p>
           <a:p>
@@ -23421,7 +23405,7 @@
               <a:rPr lang="en-US" dirty="0">
                 <a:sym typeface="Symbol"/>
               </a:rPr>
-              <a:t>As a result, such models perform very well on training data but has high error rates on test data.</a:t>
+              <a:t>As a result, such models perform very well on training data but have high error rates on test data.</a:t>
             </a:r>
           </a:p>
           <a:p>
@@ -23760,7 +23744,7 @@
             </a:pPr>
             <a:r>
               <a:rPr lang="en-US" dirty="0"/>
-              <a:t>When we are tuning Parameter controls, we are </a:t>
+              <a:t>When we are tuning parameter controls, we are </a:t>
             </a:r>
           </a:p>
           <a:p>
@@ -23803,8 +23787,8 @@
         </p:blipFill>
         <p:spPr bwMode="auto">
           <a:xfrm>
-            <a:off x="8296212" y="2826118"/>
-            <a:ext cx="3128774" cy="2961735"/>
+            <a:off x="8900208" y="3839723"/>
+            <a:ext cx="2207834" cy="2089962"/>
           </a:xfrm>
           <a:prstGeom prst="rect">
             <a:avLst/>
@@ -24241,6 +24225,101 @@
           </p:txBody>
         </p:sp>
       </p:grpSp>
+      <p:sp>
+        <p:nvSpPr>
+          <p:cNvPr id="3" name="TextBox 2">
+            <a:extLst>
+              <a:ext uri="{FF2B5EF4-FFF2-40B4-BE49-F238E27FC236}">
+                <a16:creationId xmlns:a16="http://schemas.microsoft.com/office/drawing/2014/main" id="{6AAB7409-DFED-E7D1-6823-76B0B9EC5325}"/>
+              </a:ext>
+            </a:extLst>
+          </p:cNvPr>
+          <p:cNvSpPr txBox="1"/>
+          <p:nvPr/>
+        </p:nvSpPr>
+        <p:spPr>
+          <a:xfrm>
+            <a:off x="8275909" y="5929685"/>
+            <a:ext cx="3456432" cy="600164"/>
+          </a:xfrm>
+          <a:prstGeom prst="rect">
+            <a:avLst/>
+          </a:prstGeom>
+          <a:noFill/>
+        </p:spPr>
+        <p:txBody>
+          <a:bodyPr wrap="square" rtlCol="0">
+            <a:spAutoFit/>
+          </a:bodyPr>
+          <a:lstStyle/>
+          <a:p>
+            <a:pPr algn="ctr"/>
+            <a:r>
+              <a:rPr lang="en-US" sz="1100" dirty="0"/>
+              <a:t>center of the target (</a:t>
+            </a:r>
+            <a:r>
+              <a:rPr lang="en-US" sz="1100" dirty="0">
+                <a:solidFill>
+                  <a:srgbClr val="C00000"/>
+                </a:solidFill>
+              </a:rPr>
+              <a:t>red part</a:t>
+            </a:r>
+            <a:r>
+              <a:rPr lang="en-US" sz="1100" dirty="0"/>
+              <a:t>) is the correct values of the data. As we move away from that region, the error becomes larger and larger.</a:t>
+            </a:r>
+          </a:p>
+        </p:txBody>
+      </p:sp>
+      <p:pic>
+        <p:nvPicPr>
+          <p:cNvPr id="5122" name="Picture 2">
+            <a:extLst>
+              <a:ext uri="{FF2B5EF4-FFF2-40B4-BE49-F238E27FC236}">
+                <a16:creationId xmlns:a16="http://schemas.microsoft.com/office/drawing/2014/main" id="{5B2C6927-AF66-317A-6753-7E488F206A0F}"/>
+              </a:ext>
+            </a:extLst>
+          </p:cNvPr>
+          <p:cNvPicPr>
+            <a:picLocks noChangeAspect="1" noChangeArrowheads="1"/>
+          </p:cNvPicPr>
+          <p:nvPr/>
+        </p:nvPicPr>
+        <p:blipFill>
+          <a:blip r:embed="rId4">
+            <a:extLst>
+              <a:ext uri="{28A0092B-C50C-407E-A947-70E740481C1C}">
+                <a14:useLocalDpi xmlns:a14="http://schemas.microsoft.com/office/drawing/2010/main" val="0"/>
+              </a:ext>
+            </a:extLst>
+          </a:blip>
+          <a:srcRect/>
+          <a:stretch>
+            <a:fillRect/>
+          </a:stretch>
+        </p:blipFill>
+        <p:spPr bwMode="auto">
+          <a:xfrm>
+            <a:off x="8352030" y="2685975"/>
+            <a:ext cx="3133596" cy="910043"/>
+          </a:xfrm>
+          <a:prstGeom prst="rect">
+            <a:avLst/>
+          </a:prstGeom>
+          <a:noFill/>
+          <a:extLst>
+            <a:ext uri="{909E8E84-426E-40DD-AFC4-6F175D3DCCD1}">
+              <a14:hiddenFill xmlns:a14="http://schemas.microsoft.com/office/drawing/2010/main">
+                <a:solidFill>
+                  <a:srgbClr val="FFFFFF"/>
+                </a:solidFill>
+              </a14:hiddenFill>
+            </a:ext>
+          </a:extLst>
+        </p:spPr>
+      </p:pic>
     </p:spTree>
     <p:extLst>
       <p:ext uri="{BB962C8B-B14F-4D97-AF65-F5344CB8AC3E}">
@@ -24452,23 +24531,7 @@
                   <a:srgbClr val="E46102"/>
                 </a:solidFill>
               </a:rPr>
-              <a:t>Discussion: </a:t>
-            </a:r>
-            <a:r>
-              <a:rPr lang="en-US" sz="4000" b="1" dirty="0" err="1">
-                <a:solidFill>
-                  <a:srgbClr val="E46102"/>
-                </a:solidFill>
-              </a:rPr>
-              <a:t>kNN</a:t>
-            </a:r>
-            <a:r>
-              <a:rPr lang="en-US" sz="4000" b="1" dirty="0">
-                <a:solidFill>
-                  <a:srgbClr val="E46102"/>
-                </a:solidFill>
-              </a:rPr>
-              <a:t> (Bias vs Variance)</a:t>
+              <a:t>Bias</a:t>
             </a:r>
             <a:endParaRPr sz="4000" b="1" dirty="0">
               <a:solidFill>
@@ -24478,12 +24541,479 @@
           </a:p>
         </p:txBody>
       </p:sp>
+      <p:pic>
+        <p:nvPicPr>
+          <p:cNvPr id="22530" name="Picture 2" descr="Day 3 — K-Nearest Neighbors and Bias–Variance Tradeoff | by Tzu-Chi Lin |  30 days of Machine Learning | Medium">
+            <a:extLst>
+              <a:ext uri="{FF2B5EF4-FFF2-40B4-BE49-F238E27FC236}">
+                <a16:creationId xmlns:a16="http://schemas.microsoft.com/office/drawing/2014/main" id="{E1AC61AC-62E4-437F-A7AD-62854CA5FA4F}"/>
+              </a:ext>
+            </a:extLst>
+          </p:cNvPr>
+          <p:cNvPicPr>
+            <a:picLocks noChangeAspect="1" noChangeArrowheads="1"/>
+          </p:cNvPicPr>
+          <p:nvPr/>
+        </p:nvPicPr>
+        <p:blipFill>
+          <a:blip r:embed="rId3">
+            <a:extLst>
+              <a:ext uri="{28A0092B-C50C-407E-A947-70E740481C1C}">
+                <a14:useLocalDpi xmlns:a14="http://schemas.microsoft.com/office/drawing/2010/main" val="0"/>
+              </a:ext>
+            </a:extLst>
+          </a:blip>
+          <a:srcRect/>
+          <a:stretch>
+            <a:fillRect/>
+          </a:stretch>
+        </p:blipFill>
+        <p:spPr bwMode="auto">
+          <a:xfrm>
+            <a:off x="8974751" y="3721184"/>
+            <a:ext cx="2470416" cy="2338525"/>
+          </a:xfrm>
+          <a:prstGeom prst="rect">
+            <a:avLst/>
+          </a:prstGeom>
+          <a:noFill/>
+          <a:extLst>
+            <a:ext uri="{909E8E84-426E-40DD-AFC4-6F175D3DCCD1}">
+              <a14:hiddenFill xmlns:a14="http://schemas.microsoft.com/office/drawing/2010/main">
+                <a:solidFill>
+                  <a:srgbClr val="FFFFFF"/>
+                </a:solidFill>
+              </a14:hiddenFill>
+            </a:ext>
+          </a:extLst>
+        </p:spPr>
+      </p:pic>
+      <p:grpSp>
+        <p:nvGrpSpPr>
+          <p:cNvPr id="12" name="Group 11">
+            <a:extLst>
+              <a:ext uri="{FF2B5EF4-FFF2-40B4-BE49-F238E27FC236}">
+                <a16:creationId xmlns:a16="http://schemas.microsoft.com/office/drawing/2014/main" id="{30D615BB-915B-4EC7-9AA4-730DD380065B}"/>
+              </a:ext>
+            </a:extLst>
+          </p:cNvPr>
+          <p:cNvGrpSpPr/>
+          <p:nvPr/>
+        </p:nvGrpSpPr>
+        <p:grpSpPr>
+          <a:xfrm>
+            <a:off x="1072924" y="5294374"/>
+            <a:ext cx="6470876" cy="1337352"/>
+            <a:chOff x="1072924" y="3862747"/>
+            <a:chExt cx="6760104" cy="1779699"/>
+          </a:xfrm>
+        </p:grpSpPr>
+        <p:cxnSp>
+          <p:nvCxnSpPr>
+            <p:cNvPr id="4" name="Straight Arrow Connector 3">
+              <a:extLst>
+                <a:ext uri="{FF2B5EF4-FFF2-40B4-BE49-F238E27FC236}">
+                  <a16:creationId xmlns:a16="http://schemas.microsoft.com/office/drawing/2014/main" id="{3B4F5E36-3F1F-49BC-AFEB-CE6920AF77DE}"/>
+                </a:ext>
+              </a:extLst>
+            </p:cNvPr>
+            <p:cNvCxnSpPr/>
+            <p:nvPr/>
+          </p:nvCxnSpPr>
+          <p:spPr>
+            <a:xfrm>
+              <a:off x="1083958" y="5062506"/>
+              <a:ext cx="6467412" cy="0"/>
+            </a:xfrm>
+            <a:prstGeom prst="straightConnector1">
+              <a:avLst/>
+            </a:prstGeom>
+            <a:ln w="57150">
+              <a:headEnd type="triangle"/>
+              <a:tailEnd type="triangle"/>
+            </a:ln>
+            <a:effectLst/>
+          </p:spPr>
+          <p:style>
+            <a:lnRef idx="3">
+              <a:schemeClr val="accent1"/>
+            </a:lnRef>
+            <a:fillRef idx="0">
+              <a:schemeClr val="accent1"/>
+            </a:fillRef>
+            <a:effectRef idx="2">
+              <a:schemeClr val="accent1"/>
+            </a:effectRef>
+            <a:fontRef idx="minor">
+              <a:schemeClr val="tx1"/>
+            </a:fontRef>
+          </p:style>
+        </p:cxnSp>
+        <p:sp>
+          <p:nvSpPr>
+            <p:cNvPr id="8" name="Arrow: Right 7">
+              <a:extLst>
+                <a:ext uri="{FF2B5EF4-FFF2-40B4-BE49-F238E27FC236}">
+                  <a16:creationId xmlns:a16="http://schemas.microsoft.com/office/drawing/2014/main" id="{AC03E9E5-A9CC-4C59-B2BE-1F931738BD8D}"/>
+                </a:ext>
+              </a:extLst>
+            </p:cNvPr>
+            <p:cNvSpPr/>
+            <p:nvPr/>
+          </p:nvSpPr>
+          <p:spPr>
+            <a:xfrm rot="16200000">
+              <a:off x="966855" y="4551770"/>
+              <a:ext cx="362455" cy="150316"/>
+            </a:xfrm>
+            <a:prstGeom prst="rightArrow">
+              <a:avLst/>
+            </a:prstGeom>
+          </p:spPr>
+          <p:style>
+            <a:lnRef idx="2">
+              <a:schemeClr val="dk1">
+                <a:shade val="50000"/>
+              </a:schemeClr>
+            </a:lnRef>
+            <a:fillRef idx="1">
+              <a:schemeClr val="dk1"/>
+            </a:fillRef>
+            <a:effectRef idx="0">
+              <a:schemeClr val="dk1"/>
+            </a:effectRef>
+            <a:fontRef idx="minor">
+              <a:schemeClr val="lt1"/>
+            </a:fontRef>
+          </p:style>
+          <p:txBody>
+            <a:bodyPr rtlCol="0" anchor="ctr"/>
+            <a:lstStyle/>
+            <a:p>
+              <a:pPr algn="ctr"/>
+              <a:endParaRPr lang="en-US"/>
+            </a:p>
+          </p:txBody>
+        </p:sp>
+        <p:sp>
+          <p:nvSpPr>
+            <p:cNvPr id="9" name="Arrow: Right 8">
+              <a:extLst>
+                <a:ext uri="{FF2B5EF4-FFF2-40B4-BE49-F238E27FC236}">
+                  <a16:creationId xmlns:a16="http://schemas.microsoft.com/office/drawing/2014/main" id="{3763246C-E720-492C-85BC-07362804B2C2}"/>
+                </a:ext>
+              </a:extLst>
+            </p:cNvPr>
+            <p:cNvSpPr/>
+            <p:nvPr/>
+          </p:nvSpPr>
+          <p:spPr>
+            <a:xfrm rot="5400000">
+              <a:off x="958814" y="4101398"/>
+              <a:ext cx="362455" cy="134236"/>
+            </a:xfrm>
+            <a:prstGeom prst="rightArrow">
+              <a:avLst/>
+            </a:prstGeom>
+          </p:spPr>
+          <p:style>
+            <a:lnRef idx="2">
+              <a:schemeClr val="dk1">
+                <a:shade val="50000"/>
+              </a:schemeClr>
+            </a:lnRef>
+            <a:fillRef idx="1">
+              <a:schemeClr val="dk1"/>
+            </a:fillRef>
+            <a:effectRef idx="0">
+              <a:schemeClr val="dk1"/>
+            </a:effectRef>
+            <a:fontRef idx="minor">
+              <a:schemeClr val="lt1"/>
+            </a:fontRef>
+          </p:style>
+          <p:txBody>
+            <a:bodyPr rtlCol="0" anchor="ctr"/>
+            <a:lstStyle/>
+            <a:p>
+              <a:pPr algn="ctr"/>
+              <a:endParaRPr lang="en-US"/>
+            </a:p>
+          </p:txBody>
+        </p:sp>
+        <p:sp>
+          <p:nvSpPr>
+            <p:cNvPr id="10" name="Arrow: Right 9">
+              <a:extLst>
+                <a:ext uri="{FF2B5EF4-FFF2-40B4-BE49-F238E27FC236}">
+                  <a16:creationId xmlns:a16="http://schemas.microsoft.com/office/drawing/2014/main" id="{30AEB09C-A97F-41D7-B651-981A8F9A2E22}"/>
+                </a:ext>
+              </a:extLst>
+            </p:cNvPr>
+            <p:cNvSpPr/>
+            <p:nvPr/>
+          </p:nvSpPr>
+          <p:spPr>
+            <a:xfrm rot="5400000">
+              <a:off x="7294986" y="4563917"/>
+              <a:ext cx="362455" cy="150316"/>
+            </a:xfrm>
+            <a:prstGeom prst="rightArrow">
+              <a:avLst/>
+            </a:prstGeom>
+          </p:spPr>
+          <p:style>
+            <a:lnRef idx="2">
+              <a:schemeClr val="dk1">
+                <a:shade val="50000"/>
+              </a:schemeClr>
+            </a:lnRef>
+            <a:fillRef idx="1">
+              <a:schemeClr val="dk1"/>
+            </a:fillRef>
+            <a:effectRef idx="0">
+              <a:schemeClr val="dk1"/>
+            </a:effectRef>
+            <a:fontRef idx="minor">
+              <a:schemeClr val="lt1"/>
+            </a:fontRef>
+          </p:style>
+          <p:txBody>
+            <a:bodyPr rtlCol="0" anchor="ctr"/>
+            <a:lstStyle/>
+            <a:p>
+              <a:pPr algn="ctr"/>
+              <a:endParaRPr lang="en-US"/>
+            </a:p>
+          </p:txBody>
+        </p:sp>
+        <p:sp>
+          <p:nvSpPr>
+            <p:cNvPr id="11" name="Arrow: Right 10">
+              <a:extLst>
+                <a:ext uri="{FF2B5EF4-FFF2-40B4-BE49-F238E27FC236}">
+                  <a16:creationId xmlns:a16="http://schemas.microsoft.com/office/drawing/2014/main" id="{A2ED645B-7AA2-4E12-9C5C-94B215EA44C4}"/>
+                </a:ext>
+              </a:extLst>
+            </p:cNvPr>
+            <p:cNvSpPr/>
+            <p:nvPr/>
+          </p:nvSpPr>
+          <p:spPr>
+            <a:xfrm rot="16200000">
+              <a:off x="7286945" y="4113546"/>
+              <a:ext cx="362455" cy="134236"/>
+            </a:xfrm>
+            <a:prstGeom prst="rightArrow">
+              <a:avLst/>
+            </a:prstGeom>
+          </p:spPr>
+          <p:style>
+            <a:lnRef idx="2">
+              <a:schemeClr val="dk1">
+                <a:shade val="50000"/>
+              </a:schemeClr>
+            </a:lnRef>
+            <a:fillRef idx="1">
+              <a:schemeClr val="dk1"/>
+            </a:fillRef>
+            <a:effectRef idx="0">
+              <a:schemeClr val="dk1"/>
+            </a:effectRef>
+            <a:fontRef idx="minor">
+              <a:schemeClr val="lt1"/>
+            </a:fontRef>
+          </p:style>
+          <p:txBody>
+            <a:bodyPr rtlCol="0" anchor="ctr"/>
+            <a:lstStyle/>
+            <a:p>
+              <a:pPr algn="ctr"/>
+              <a:endParaRPr lang="en-US"/>
+            </a:p>
+          </p:txBody>
+        </p:sp>
+        <p:sp>
+          <p:nvSpPr>
+            <p:cNvPr id="6" name="TextBox 5">
+              <a:extLst>
+                <a:ext uri="{FF2B5EF4-FFF2-40B4-BE49-F238E27FC236}">
+                  <a16:creationId xmlns:a16="http://schemas.microsoft.com/office/drawing/2014/main" id="{21330036-9778-4B03-8260-A7120DCD58A2}"/>
+                </a:ext>
+              </a:extLst>
+            </p:cNvPr>
+            <p:cNvSpPr txBox="1"/>
+            <p:nvPr/>
+          </p:nvSpPr>
+          <p:spPr>
+            <a:xfrm>
+              <a:off x="1207160" y="3862747"/>
+              <a:ext cx="1114236" cy="369332"/>
+            </a:xfrm>
+            <a:prstGeom prst="rect">
+              <a:avLst/>
+            </a:prstGeom>
+            <a:noFill/>
+          </p:spPr>
+          <p:txBody>
+            <a:bodyPr wrap="square" rtlCol="0">
+              <a:spAutoFit/>
+            </a:bodyPr>
+            <a:lstStyle/>
+            <a:p>
+              <a:r>
+                <a:rPr lang="en-US" sz="1800" b="1" dirty="0"/>
+                <a:t>bias</a:t>
+              </a:r>
+            </a:p>
+          </p:txBody>
+        </p:sp>
+        <p:sp>
+          <p:nvSpPr>
+            <p:cNvPr id="13" name="TextBox 12">
+              <a:extLst>
+                <a:ext uri="{FF2B5EF4-FFF2-40B4-BE49-F238E27FC236}">
+                  <a16:creationId xmlns:a16="http://schemas.microsoft.com/office/drawing/2014/main" id="{203B3BD6-BF57-40B0-8024-BBCB52DD0642}"/>
+                </a:ext>
+              </a:extLst>
+            </p:cNvPr>
+            <p:cNvSpPr txBox="1"/>
+            <p:nvPr/>
+          </p:nvSpPr>
+          <p:spPr>
+            <a:xfrm>
+              <a:off x="6718792" y="3862747"/>
+              <a:ext cx="1114236" cy="369332"/>
+            </a:xfrm>
+            <a:prstGeom prst="rect">
+              <a:avLst/>
+            </a:prstGeom>
+            <a:noFill/>
+          </p:spPr>
+          <p:txBody>
+            <a:bodyPr wrap="square" rtlCol="0">
+              <a:spAutoFit/>
+            </a:bodyPr>
+            <a:lstStyle/>
+            <a:p>
+              <a:r>
+                <a:rPr lang="en-US" sz="1800" b="1" dirty="0"/>
+                <a:t>bias</a:t>
+              </a:r>
+            </a:p>
+          </p:txBody>
+        </p:sp>
+        <p:sp>
+          <p:nvSpPr>
+            <p:cNvPr id="14" name="TextBox 13">
+              <a:extLst>
+                <a:ext uri="{FF2B5EF4-FFF2-40B4-BE49-F238E27FC236}">
+                  <a16:creationId xmlns:a16="http://schemas.microsoft.com/office/drawing/2014/main" id="{9EB15D79-4B7D-4CCC-BAF5-749486D78297}"/>
+                </a:ext>
+              </a:extLst>
+            </p:cNvPr>
+            <p:cNvSpPr txBox="1"/>
+            <p:nvPr/>
+          </p:nvSpPr>
+          <p:spPr>
+            <a:xfrm>
+              <a:off x="1232429" y="4539198"/>
+              <a:ext cx="1114236" cy="369332"/>
+            </a:xfrm>
+            <a:prstGeom prst="rect">
+              <a:avLst/>
+            </a:prstGeom>
+            <a:noFill/>
+          </p:spPr>
+          <p:txBody>
+            <a:bodyPr wrap="square" rtlCol="0">
+              <a:spAutoFit/>
+            </a:bodyPr>
+            <a:lstStyle/>
+            <a:p>
+              <a:r>
+                <a:rPr lang="en-US" sz="1800" b="1" dirty="0"/>
+                <a:t>variance</a:t>
+              </a:r>
+            </a:p>
+          </p:txBody>
+        </p:sp>
+        <p:sp>
+          <p:nvSpPr>
+            <p:cNvPr id="15" name="TextBox 14">
+              <a:extLst>
+                <a:ext uri="{FF2B5EF4-FFF2-40B4-BE49-F238E27FC236}">
+                  <a16:creationId xmlns:a16="http://schemas.microsoft.com/office/drawing/2014/main" id="{B84F2745-3611-4B2B-82BC-335B13FF8483}"/>
+                </a:ext>
+              </a:extLst>
+            </p:cNvPr>
+            <p:cNvSpPr txBox="1"/>
+            <p:nvPr/>
+          </p:nvSpPr>
+          <p:spPr>
+            <a:xfrm>
+              <a:off x="6277631" y="4565999"/>
+              <a:ext cx="1114236" cy="369332"/>
+            </a:xfrm>
+            <a:prstGeom prst="rect">
+              <a:avLst/>
+            </a:prstGeom>
+            <a:noFill/>
+          </p:spPr>
+          <p:txBody>
+            <a:bodyPr wrap="square" rtlCol="0">
+              <a:spAutoFit/>
+            </a:bodyPr>
+            <a:lstStyle/>
+            <a:p>
+              <a:r>
+                <a:rPr lang="en-US" sz="1800" b="1" dirty="0"/>
+                <a:t>variance</a:t>
+              </a:r>
+            </a:p>
+          </p:txBody>
+        </p:sp>
+        <p:sp>
+          <p:nvSpPr>
+            <p:cNvPr id="7" name="Rectangle 6">
+              <a:extLst>
+                <a:ext uri="{FF2B5EF4-FFF2-40B4-BE49-F238E27FC236}">
+                  <a16:creationId xmlns:a16="http://schemas.microsoft.com/office/drawing/2014/main" id="{F84607F5-B3BB-44DF-A633-AE7EE27877F4}"/>
+                </a:ext>
+              </a:extLst>
+            </p:cNvPr>
+            <p:cNvSpPr/>
+            <p:nvPr/>
+          </p:nvSpPr>
+          <p:spPr>
+            <a:xfrm>
+              <a:off x="3144845" y="5150953"/>
+              <a:ext cx="2135516" cy="491493"/>
+            </a:xfrm>
+            <a:prstGeom prst="rect">
+              <a:avLst/>
+            </a:prstGeom>
+          </p:spPr>
+          <p:txBody>
+            <a:bodyPr wrap="none">
+              <a:spAutoFit/>
+            </a:bodyPr>
+            <a:lstStyle/>
+            <a:p>
+              <a:r>
+                <a:rPr lang="en-US" sz="1800" dirty="0"/>
+                <a:t>tuning parameters</a:t>
+              </a:r>
+            </a:p>
+          </p:txBody>
+        </p:sp>
+      </p:grpSp>
       <p:sp>
         <p:nvSpPr>
-          <p:cNvPr id="2" name="TextBox 1">
+          <p:cNvPr id="5" name="TextBox 4">
             <a:extLst>
               <a:ext uri="{FF2B5EF4-FFF2-40B4-BE49-F238E27FC236}">
-                <a16:creationId xmlns:a16="http://schemas.microsoft.com/office/drawing/2014/main" id="{3A5DBC26-7440-4310-878C-EABC6AE57D06}"/>
+                <a16:creationId xmlns:a16="http://schemas.microsoft.com/office/drawing/2014/main" id="{FF078D7A-8502-0616-B175-F5A1BD224A76}"/>
               </a:ext>
             </a:extLst>
           </p:cNvPr>
@@ -24492,8 +25022,201 @@
         </p:nvSpPr>
         <p:spPr>
           <a:xfrm>
-            <a:off x="982327" y="1672944"/>
-            <a:ext cx="10359866" cy="3539430"/>
+            <a:off x="844317" y="1791652"/>
+            <a:ext cx="10875191" cy="2246769"/>
+          </a:xfrm>
+          <a:prstGeom prst="rect">
+            <a:avLst/>
+          </a:prstGeom>
+          <a:noFill/>
+        </p:spPr>
+        <p:txBody>
+          <a:bodyPr wrap="square">
+            <a:spAutoFit/>
+          </a:bodyPr>
+          <a:lstStyle/>
+          <a:p>
+            <a:r>
+              <a:rPr lang="en-US" sz="2000" b="1" dirty="0"/>
+              <a:t>Bias</a:t>
+            </a:r>
+            <a:r>
+              <a:rPr lang="en-US" sz="2000" dirty="0"/>
+              <a:t> : Error that occurs when model unable to learn underlying pattern in training data</a:t>
+            </a:r>
+          </a:p>
+          <a:p>
+            <a:endParaRPr lang="en-US" sz="2000" dirty="0"/>
+          </a:p>
+          <a:p>
+            <a:r>
+              <a:rPr lang="en-US" sz="2000" dirty="0"/>
+              <a:t>Why?</a:t>
+            </a:r>
+          </a:p>
+          <a:p>
+            <a:endParaRPr lang="en-US" sz="2000" dirty="0"/>
+          </a:p>
+          <a:p>
+            <a:pPr marL="342900" indent="-342900">
+              <a:buFont typeface="Arial" panose="020B0604020202020204" pitchFamily="34" charset="0"/>
+              <a:buChar char="•"/>
+            </a:pPr>
+            <a:r>
+              <a:rPr lang="en-US" sz="2000" dirty="0"/>
+              <a:t>Model is too simple and cannot capture complexity of the data.</a:t>
+            </a:r>
+          </a:p>
+          <a:p>
+            <a:pPr marL="342900" indent="-342900">
+              <a:buFont typeface="Arial" panose="020B0604020202020204" pitchFamily="34" charset="0"/>
+              <a:buChar char="•"/>
+            </a:pPr>
+            <a:r>
+              <a:rPr lang="en-US" sz="2000" dirty="0"/>
+              <a:t>Training data not representative of real-world data.</a:t>
+            </a:r>
+          </a:p>
+          <a:p>
+            <a:pPr marL="342900" indent="-342900">
+              <a:buFont typeface="Arial" panose="020B0604020202020204" pitchFamily="34" charset="0"/>
+              <a:buChar char="•"/>
+            </a:pPr>
+            <a:r>
+              <a:rPr lang="en-US" sz="2000" dirty="0"/>
+              <a:t>Model biased towards certain parts of data.</a:t>
+            </a:r>
+          </a:p>
+        </p:txBody>
+      </p:sp>
+      <p:pic>
+        <p:nvPicPr>
+          <p:cNvPr id="2050" name="Picture 2">
+            <a:extLst>
+              <a:ext uri="{FF2B5EF4-FFF2-40B4-BE49-F238E27FC236}">
+                <a16:creationId xmlns:a16="http://schemas.microsoft.com/office/drawing/2014/main" id="{6023CDB0-AD84-D17A-843C-9243525577DC}"/>
+              </a:ext>
+            </a:extLst>
+          </p:cNvPr>
+          <p:cNvPicPr>
+            <a:picLocks noChangeAspect="1" noChangeArrowheads="1"/>
+          </p:cNvPicPr>
+          <p:nvPr/>
+        </p:nvPicPr>
+        <p:blipFill>
+          <a:blip r:embed="rId4">
+            <a:extLst>
+              <a:ext uri="{BEBA8EAE-BF5A-486C-A8C5-ECC9F3942E4B}">
+                <a14:imgProps xmlns:a14="http://schemas.microsoft.com/office/drawing/2010/main">
+                  <a14:imgLayer r:embed="rId5">
+                    <a14:imgEffect>
+                      <a14:sharpenSoften amount="25000"/>
+                    </a14:imgEffect>
+                  </a14:imgLayer>
+                </a14:imgProps>
+              </a:ext>
+              <a:ext uri="{28A0092B-C50C-407E-A947-70E740481C1C}">
+                <a14:useLocalDpi xmlns:a14="http://schemas.microsoft.com/office/drawing/2010/main" val="0"/>
+              </a:ext>
+            </a:extLst>
+          </a:blip>
+          <a:srcRect/>
+          <a:stretch>
+            <a:fillRect/>
+          </a:stretch>
+        </p:blipFill>
+        <p:spPr bwMode="auto">
+          <a:xfrm>
+            <a:off x="8460232" y="2319020"/>
+            <a:ext cx="2641600" cy="482600"/>
+          </a:xfrm>
+          <a:prstGeom prst="rect">
+            <a:avLst/>
+          </a:prstGeom>
+          <a:noFill/>
+          <a:extLst>
+            <a:ext uri="{909E8E84-426E-40DD-AFC4-6F175D3DCCD1}">
+              <a14:hiddenFill xmlns:a14="http://schemas.microsoft.com/office/drawing/2010/main">
+                <a:solidFill>
+                  <a:srgbClr val="FFFFFF"/>
+                </a:solidFill>
+              </a14:hiddenFill>
+            </a:ext>
+          </a:extLst>
+        </p:spPr>
+      </p:pic>
+      <p:sp>
+        <p:nvSpPr>
+          <p:cNvPr id="17" name="TextBox 16">
+            <a:extLst>
+              <a:ext uri="{FF2B5EF4-FFF2-40B4-BE49-F238E27FC236}">
+                <a16:creationId xmlns:a16="http://schemas.microsoft.com/office/drawing/2014/main" id="{F400603A-FE40-8943-2CCC-6DF4787635C8}"/>
+              </a:ext>
+            </a:extLst>
+          </p:cNvPr>
+          <p:cNvSpPr txBox="1"/>
+          <p:nvPr/>
+        </p:nvSpPr>
+        <p:spPr>
+          <a:xfrm>
+            <a:off x="7801356" y="2658277"/>
+            <a:ext cx="3959352" cy="307777"/>
+          </a:xfrm>
+          <a:prstGeom prst="rect">
+            <a:avLst/>
+          </a:prstGeom>
+          <a:noFill/>
+        </p:spPr>
+        <p:txBody>
+          <a:bodyPr wrap="square">
+            <a:spAutoFit/>
+          </a:bodyPr>
+          <a:lstStyle/>
+          <a:p>
+            <a:pPr algn="ctr"/>
+            <a:r>
+              <a:rPr lang="en-US" sz="1400" dirty="0">
+                <a:solidFill>
+                  <a:schemeClr val="accent1"/>
+                </a:solidFill>
+                <a:latin typeface="source-serif-pro"/>
+              </a:rPr>
+              <a:t>D</a:t>
+            </a:r>
+            <a:r>
+              <a:rPr lang="en-US" sz="1400" b="0" i="0" dirty="0">
+                <a:solidFill>
+                  <a:schemeClr val="accent1"/>
+                </a:solidFill>
+                <a:effectLst/>
+                <a:latin typeface="source-serif-pro"/>
+              </a:rPr>
+              <a:t>ifference between true label and prediction</a:t>
+            </a:r>
+            <a:endParaRPr lang="en-US" sz="1400" dirty="0">
+              <a:solidFill>
+                <a:schemeClr val="accent1"/>
+              </a:solidFill>
+            </a:endParaRPr>
+          </a:p>
+        </p:txBody>
+      </p:sp>
+      <p:sp>
+        <p:nvSpPr>
+          <p:cNvPr id="18" name="TextBox 17">
+            <a:extLst>
+              <a:ext uri="{FF2B5EF4-FFF2-40B4-BE49-F238E27FC236}">
+                <a16:creationId xmlns:a16="http://schemas.microsoft.com/office/drawing/2014/main" id="{EA3D03C1-A91A-9EEA-54EE-7ABF2EF50AD7}"/>
+              </a:ext>
+            </a:extLst>
+          </p:cNvPr>
+          <p:cNvSpPr txBox="1"/>
+          <p:nvPr/>
+        </p:nvSpPr>
+        <p:spPr>
+          <a:xfrm>
+            <a:off x="8481743" y="6080226"/>
+            <a:ext cx="3456432" cy="507831"/>
           </a:xfrm>
           <a:prstGeom prst="rect">
             <a:avLst/>
@@ -24506,52 +25229,22 @@
           </a:bodyPr>
           <a:lstStyle/>
           <a:p>
-            <a:r>
-              <a:rPr lang="en-US" sz="2800" dirty="0"/>
-              <a:t>Increasing </a:t>
-            </a:r>
-            <a:r>
-              <a:rPr lang="en-US" sz="2800" b="1" dirty="0"/>
-              <a:t>k</a:t>
-            </a:r>
-            <a:r>
-              <a:rPr lang="en-US" sz="2800" dirty="0"/>
-              <a:t> in the </a:t>
-            </a:r>
-            <a:r>
-              <a:rPr lang="en-US" sz="2800" dirty="0" err="1"/>
-              <a:t>kNN</a:t>
-            </a:r>
-            <a:r>
-              <a:rPr lang="en-US" sz="2800" dirty="0"/>
-              <a:t> algorithm should have what effect on:</a:t>
-            </a:r>
-          </a:p>
-          <a:p>
-            <a:endParaRPr lang="en-US" sz="2800" dirty="0"/>
-          </a:p>
-          <a:p>
-            <a:endParaRPr lang="en-US" sz="2800" dirty="0"/>
-          </a:p>
-          <a:p>
-            <a:r>
-              <a:rPr lang="en-US" sz="2800" b="1" dirty="0"/>
-              <a:t>Bias: ?</a:t>
-            </a:r>
-          </a:p>
-          <a:p>
-            <a:endParaRPr lang="en-US" sz="2800" b="1" dirty="0"/>
-          </a:p>
-          <a:p>
-            <a:endParaRPr lang="en-US" sz="2800" b="1" dirty="0"/>
-          </a:p>
-          <a:p>
-            <a:endParaRPr lang="en-US" sz="2800" b="1" dirty="0"/>
-          </a:p>
-          <a:p>
-            <a:r>
-              <a:rPr lang="en-US" sz="2800" b="1" dirty="0"/>
-              <a:t>Variance: ?</a:t>
+            <a:pPr algn="ctr"/>
+            <a:r>
+              <a:rPr lang="en-US" sz="900" dirty="0"/>
+              <a:t>center of the target (</a:t>
+            </a:r>
+            <a:r>
+              <a:rPr lang="en-US" sz="900" dirty="0">
+                <a:solidFill>
+                  <a:srgbClr val="C00000"/>
+                </a:solidFill>
+              </a:rPr>
+              <a:t>red part</a:t>
+            </a:r>
+            <a:r>
+              <a:rPr lang="en-US" sz="900" dirty="0"/>
+              <a:t>) is the correct values of the data. As we move away from that region, the error becomes larger and larger.</a:t>
             </a:r>
           </a:p>
         </p:txBody>
@@ -24559,13 +25252,115 @@
     </p:spTree>
     <p:extLst>
       <p:ext uri="{BB962C8B-B14F-4D97-AF65-F5344CB8AC3E}">
-        <p14:creationId xmlns:p14="http://schemas.microsoft.com/office/powerpoint/2010/main" val="563636587"/>
+        <p14:creationId xmlns:p14="http://schemas.microsoft.com/office/powerpoint/2010/main" val="3903746470"/>
       </p:ext>
     </p:extLst>
   </p:cSld>
   <p:clrMapOvr>
     <a:masterClrMapping/>
   </p:clrMapOvr>
+  <p:timing>
+    <p:tnLst>
+      <p:par>
+        <p:cTn id="1" dur="indefinite" restart="never" nodeType="tmRoot">
+          <p:childTnLst>
+            <p:seq concurrent="1" nextAc="seek">
+              <p:cTn id="2" dur="indefinite" nodeType="mainSeq">
+                <p:childTnLst>
+                  <p:par>
+                    <p:cTn id="3" fill="hold">
+                      <p:stCondLst>
+                        <p:cond delay="indefinite"/>
+                      </p:stCondLst>
+                      <p:childTnLst>
+                        <p:par>
+                          <p:cTn id="4" fill="hold">
+                            <p:stCondLst>
+                              <p:cond delay="0"/>
+                            </p:stCondLst>
+                            <p:childTnLst>
+                              <p:par>
+                                <p:cTn id="5" presetID="1" presetClass="entr" presetSubtype="0" fill="hold" nodeType="clickEffect">
+                                  <p:stCondLst>
+                                    <p:cond delay="0"/>
+                                  </p:stCondLst>
+                                  <p:childTnLst>
+                                    <p:set>
+                                      <p:cBhvr>
+                                        <p:cTn id="6" dur="1" fill="hold">
+                                          <p:stCondLst>
+                                            <p:cond delay="0"/>
+                                          </p:stCondLst>
+                                        </p:cTn>
+                                        <p:tgtEl>
+                                          <p:spTgt spid="12"/>
+                                        </p:tgtEl>
+                                        <p:attrNameLst>
+                                          <p:attrName>style.visibility</p:attrName>
+                                        </p:attrNameLst>
+                                      </p:cBhvr>
+                                      <p:to>
+                                        <p:strVal val="visible"/>
+                                      </p:to>
+                                    </p:set>
+                                  </p:childTnLst>
+                                </p:cTn>
+                              </p:par>
+                              <p:par>
+                                <p:cTn id="7" presetID="1" presetClass="entr" presetSubtype="0" fill="hold" nodeType="withEffect">
+                                  <p:stCondLst>
+                                    <p:cond delay="0"/>
+                                  </p:stCondLst>
+                                  <p:childTnLst>
+                                    <p:set>
+                                      <p:cBhvr>
+                                        <p:cTn id="8" dur="1" fill="hold">
+                                          <p:stCondLst>
+                                            <p:cond delay="0"/>
+                                          </p:stCondLst>
+                                        </p:cTn>
+                                        <p:tgtEl>
+                                          <p:spTgt spid="22530"/>
+                                        </p:tgtEl>
+                                        <p:attrNameLst>
+                                          <p:attrName>style.visibility</p:attrName>
+                                        </p:attrNameLst>
+                                      </p:cBhvr>
+                                      <p:to>
+                                        <p:strVal val="visible"/>
+                                      </p:to>
+                                    </p:set>
+                                  </p:childTnLst>
+                                </p:cTn>
+                              </p:par>
+                            </p:childTnLst>
+                          </p:cTn>
+                        </p:par>
+                      </p:childTnLst>
+                    </p:cTn>
+                  </p:par>
+                </p:childTnLst>
+              </p:cTn>
+              <p:prevCondLst>
+                <p:cond evt="onPrev" delay="0">
+                  <p:tgtEl>
+                    <p:sldTgt/>
+                  </p:tgtEl>
+                </p:cond>
+              </p:prevCondLst>
+              <p:nextCondLst>
+                <p:cond evt="onNext" delay="0">
+                  <p:tgtEl>
+                    <p:sldTgt/>
+                  </p:tgtEl>
+                </p:cond>
+              </p:nextCondLst>
+            </p:seq>
+          </p:childTnLst>
+        </p:cTn>
+      </p:par>
+    </p:tnLst>
+  </p:timing>
 </p:sld>
 </file>
 
@@ -24617,23 +25412,7 @@
                   <a:srgbClr val="E46102"/>
                 </a:solidFill>
               </a:rPr>
-              <a:t>Discussion: </a:t>
-            </a:r>
-            <a:r>
-              <a:rPr lang="en-US" sz="4000" b="1" dirty="0" err="1">
-                <a:solidFill>
-                  <a:srgbClr val="E46102"/>
-                </a:solidFill>
-              </a:rPr>
-              <a:t>kNN</a:t>
-            </a:r>
-            <a:r>
-              <a:rPr lang="en-US" sz="4000" b="1" dirty="0">
-                <a:solidFill>
-                  <a:srgbClr val="E46102"/>
-                </a:solidFill>
-              </a:rPr>
-              <a:t> (Bias vs Variance)</a:t>
+              <a:t>Variance</a:t>
             </a:r>
             <a:endParaRPr sz="4000" b="1" dirty="0">
               <a:solidFill>
@@ -24643,12 +25422,433 @@
           </a:p>
         </p:txBody>
       </p:sp>
+      <p:grpSp>
+        <p:nvGrpSpPr>
+          <p:cNvPr id="12" name="Group 11">
+            <a:extLst>
+              <a:ext uri="{FF2B5EF4-FFF2-40B4-BE49-F238E27FC236}">
+                <a16:creationId xmlns:a16="http://schemas.microsoft.com/office/drawing/2014/main" id="{30D615BB-915B-4EC7-9AA4-730DD380065B}"/>
+              </a:ext>
+            </a:extLst>
+          </p:cNvPr>
+          <p:cNvGrpSpPr/>
+          <p:nvPr/>
+        </p:nvGrpSpPr>
+        <p:grpSpPr>
+          <a:xfrm>
+            <a:off x="1072924" y="5294374"/>
+            <a:ext cx="6470876" cy="1337352"/>
+            <a:chOff x="1072924" y="3862747"/>
+            <a:chExt cx="6760104" cy="1779699"/>
+          </a:xfrm>
+        </p:grpSpPr>
+        <p:cxnSp>
+          <p:nvCxnSpPr>
+            <p:cNvPr id="4" name="Straight Arrow Connector 3">
+              <a:extLst>
+                <a:ext uri="{FF2B5EF4-FFF2-40B4-BE49-F238E27FC236}">
+                  <a16:creationId xmlns:a16="http://schemas.microsoft.com/office/drawing/2014/main" id="{3B4F5E36-3F1F-49BC-AFEB-CE6920AF77DE}"/>
+                </a:ext>
+              </a:extLst>
+            </p:cNvPr>
+            <p:cNvCxnSpPr/>
+            <p:nvPr/>
+          </p:nvCxnSpPr>
+          <p:spPr>
+            <a:xfrm>
+              <a:off x="1083958" y="5062506"/>
+              <a:ext cx="6467412" cy="0"/>
+            </a:xfrm>
+            <a:prstGeom prst="straightConnector1">
+              <a:avLst/>
+            </a:prstGeom>
+            <a:ln w="57150">
+              <a:headEnd type="triangle"/>
+              <a:tailEnd type="triangle"/>
+            </a:ln>
+            <a:effectLst/>
+          </p:spPr>
+          <p:style>
+            <a:lnRef idx="3">
+              <a:schemeClr val="accent1"/>
+            </a:lnRef>
+            <a:fillRef idx="0">
+              <a:schemeClr val="accent1"/>
+            </a:fillRef>
+            <a:effectRef idx="2">
+              <a:schemeClr val="accent1"/>
+            </a:effectRef>
+            <a:fontRef idx="minor">
+              <a:schemeClr val="tx1"/>
+            </a:fontRef>
+          </p:style>
+        </p:cxnSp>
+        <p:sp>
+          <p:nvSpPr>
+            <p:cNvPr id="8" name="Arrow: Right 7">
+              <a:extLst>
+                <a:ext uri="{FF2B5EF4-FFF2-40B4-BE49-F238E27FC236}">
+                  <a16:creationId xmlns:a16="http://schemas.microsoft.com/office/drawing/2014/main" id="{AC03E9E5-A9CC-4C59-B2BE-1F931738BD8D}"/>
+                </a:ext>
+              </a:extLst>
+            </p:cNvPr>
+            <p:cNvSpPr/>
+            <p:nvPr/>
+          </p:nvSpPr>
+          <p:spPr>
+            <a:xfrm rot="16200000">
+              <a:off x="966855" y="4551770"/>
+              <a:ext cx="362455" cy="150316"/>
+            </a:xfrm>
+            <a:prstGeom prst="rightArrow">
+              <a:avLst/>
+            </a:prstGeom>
+          </p:spPr>
+          <p:style>
+            <a:lnRef idx="2">
+              <a:schemeClr val="dk1">
+                <a:shade val="50000"/>
+              </a:schemeClr>
+            </a:lnRef>
+            <a:fillRef idx="1">
+              <a:schemeClr val="dk1"/>
+            </a:fillRef>
+            <a:effectRef idx="0">
+              <a:schemeClr val="dk1"/>
+            </a:effectRef>
+            <a:fontRef idx="minor">
+              <a:schemeClr val="lt1"/>
+            </a:fontRef>
+          </p:style>
+          <p:txBody>
+            <a:bodyPr rtlCol="0" anchor="ctr"/>
+            <a:lstStyle/>
+            <a:p>
+              <a:pPr algn="ctr"/>
+              <a:endParaRPr lang="en-US"/>
+            </a:p>
+          </p:txBody>
+        </p:sp>
+        <p:sp>
+          <p:nvSpPr>
+            <p:cNvPr id="9" name="Arrow: Right 8">
+              <a:extLst>
+                <a:ext uri="{FF2B5EF4-FFF2-40B4-BE49-F238E27FC236}">
+                  <a16:creationId xmlns:a16="http://schemas.microsoft.com/office/drawing/2014/main" id="{3763246C-E720-492C-85BC-07362804B2C2}"/>
+                </a:ext>
+              </a:extLst>
+            </p:cNvPr>
+            <p:cNvSpPr/>
+            <p:nvPr/>
+          </p:nvSpPr>
+          <p:spPr>
+            <a:xfrm rot="5400000">
+              <a:off x="958814" y="4101398"/>
+              <a:ext cx="362455" cy="134236"/>
+            </a:xfrm>
+            <a:prstGeom prst="rightArrow">
+              <a:avLst/>
+            </a:prstGeom>
+          </p:spPr>
+          <p:style>
+            <a:lnRef idx="2">
+              <a:schemeClr val="dk1">
+                <a:shade val="50000"/>
+              </a:schemeClr>
+            </a:lnRef>
+            <a:fillRef idx="1">
+              <a:schemeClr val="dk1"/>
+            </a:fillRef>
+            <a:effectRef idx="0">
+              <a:schemeClr val="dk1"/>
+            </a:effectRef>
+            <a:fontRef idx="minor">
+              <a:schemeClr val="lt1"/>
+            </a:fontRef>
+          </p:style>
+          <p:txBody>
+            <a:bodyPr rtlCol="0" anchor="ctr"/>
+            <a:lstStyle/>
+            <a:p>
+              <a:pPr algn="ctr"/>
+              <a:endParaRPr lang="en-US"/>
+            </a:p>
+          </p:txBody>
+        </p:sp>
+        <p:sp>
+          <p:nvSpPr>
+            <p:cNvPr id="10" name="Arrow: Right 9">
+              <a:extLst>
+                <a:ext uri="{FF2B5EF4-FFF2-40B4-BE49-F238E27FC236}">
+                  <a16:creationId xmlns:a16="http://schemas.microsoft.com/office/drawing/2014/main" id="{30AEB09C-A97F-41D7-B651-981A8F9A2E22}"/>
+                </a:ext>
+              </a:extLst>
+            </p:cNvPr>
+            <p:cNvSpPr/>
+            <p:nvPr/>
+          </p:nvSpPr>
+          <p:spPr>
+            <a:xfrm rot="5400000">
+              <a:off x="7294986" y="4563917"/>
+              <a:ext cx="362455" cy="150316"/>
+            </a:xfrm>
+            <a:prstGeom prst="rightArrow">
+              <a:avLst/>
+            </a:prstGeom>
+          </p:spPr>
+          <p:style>
+            <a:lnRef idx="2">
+              <a:schemeClr val="dk1">
+                <a:shade val="50000"/>
+              </a:schemeClr>
+            </a:lnRef>
+            <a:fillRef idx="1">
+              <a:schemeClr val="dk1"/>
+            </a:fillRef>
+            <a:effectRef idx="0">
+              <a:schemeClr val="dk1"/>
+            </a:effectRef>
+            <a:fontRef idx="minor">
+              <a:schemeClr val="lt1"/>
+            </a:fontRef>
+          </p:style>
+          <p:txBody>
+            <a:bodyPr rtlCol="0" anchor="ctr"/>
+            <a:lstStyle/>
+            <a:p>
+              <a:pPr algn="ctr"/>
+              <a:endParaRPr lang="en-US"/>
+            </a:p>
+          </p:txBody>
+        </p:sp>
+        <p:sp>
+          <p:nvSpPr>
+            <p:cNvPr id="11" name="Arrow: Right 10">
+              <a:extLst>
+                <a:ext uri="{FF2B5EF4-FFF2-40B4-BE49-F238E27FC236}">
+                  <a16:creationId xmlns:a16="http://schemas.microsoft.com/office/drawing/2014/main" id="{A2ED645B-7AA2-4E12-9C5C-94B215EA44C4}"/>
+                </a:ext>
+              </a:extLst>
+            </p:cNvPr>
+            <p:cNvSpPr/>
+            <p:nvPr/>
+          </p:nvSpPr>
+          <p:spPr>
+            <a:xfrm rot="16200000">
+              <a:off x="7286945" y="4113546"/>
+              <a:ext cx="362455" cy="134236"/>
+            </a:xfrm>
+            <a:prstGeom prst="rightArrow">
+              <a:avLst/>
+            </a:prstGeom>
+          </p:spPr>
+          <p:style>
+            <a:lnRef idx="2">
+              <a:schemeClr val="dk1">
+                <a:shade val="50000"/>
+              </a:schemeClr>
+            </a:lnRef>
+            <a:fillRef idx="1">
+              <a:schemeClr val="dk1"/>
+            </a:fillRef>
+            <a:effectRef idx="0">
+              <a:schemeClr val="dk1"/>
+            </a:effectRef>
+            <a:fontRef idx="minor">
+              <a:schemeClr val="lt1"/>
+            </a:fontRef>
+          </p:style>
+          <p:txBody>
+            <a:bodyPr rtlCol="0" anchor="ctr"/>
+            <a:lstStyle/>
+            <a:p>
+              <a:pPr algn="ctr"/>
+              <a:endParaRPr lang="en-US"/>
+            </a:p>
+          </p:txBody>
+        </p:sp>
+        <p:sp>
+          <p:nvSpPr>
+            <p:cNvPr id="6" name="TextBox 5">
+              <a:extLst>
+                <a:ext uri="{FF2B5EF4-FFF2-40B4-BE49-F238E27FC236}">
+                  <a16:creationId xmlns:a16="http://schemas.microsoft.com/office/drawing/2014/main" id="{21330036-9778-4B03-8260-A7120DCD58A2}"/>
+                </a:ext>
+              </a:extLst>
+            </p:cNvPr>
+            <p:cNvSpPr txBox="1"/>
+            <p:nvPr/>
+          </p:nvSpPr>
+          <p:spPr>
+            <a:xfrm>
+              <a:off x="1207160" y="3862747"/>
+              <a:ext cx="1114236" cy="450535"/>
+            </a:xfrm>
+            <a:prstGeom prst="rect">
+              <a:avLst/>
+            </a:prstGeom>
+            <a:noFill/>
+          </p:spPr>
+          <p:txBody>
+            <a:bodyPr wrap="square" rtlCol="0">
+              <a:spAutoFit/>
+            </a:bodyPr>
+            <a:lstStyle/>
+            <a:p>
+              <a:r>
+                <a:rPr lang="en-US" sz="1600" b="1" dirty="0"/>
+                <a:t>bias</a:t>
+              </a:r>
+            </a:p>
+          </p:txBody>
+        </p:sp>
+        <p:sp>
+          <p:nvSpPr>
+            <p:cNvPr id="13" name="TextBox 12">
+              <a:extLst>
+                <a:ext uri="{FF2B5EF4-FFF2-40B4-BE49-F238E27FC236}">
+                  <a16:creationId xmlns:a16="http://schemas.microsoft.com/office/drawing/2014/main" id="{203B3BD6-BF57-40B0-8024-BBCB52DD0642}"/>
+                </a:ext>
+              </a:extLst>
+            </p:cNvPr>
+            <p:cNvSpPr txBox="1"/>
+            <p:nvPr/>
+          </p:nvSpPr>
+          <p:spPr>
+            <a:xfrm>
+              <a:off x="6718792" y="3862747"/>
+              <a:ext cx="1114236" cy="450535"/>
+            </a:xfrm>
+            <a:prstGeom prst="rect">
+              <a:avLst/>
+            </a:prstGeom>
+            <a:noFill/>
+          </p:spPr>
+          <p:txBody>
+            <a:bodyPr wrap="square" rtlCol="0">
+              <a:spAutoFit/>
+            </a:bodyPr>
+            <a:lstStyle/>
+            <a:p>
+              <a:r>
+                <a:rPr lang="en-US" sz="1600" b="1" dirty="0"/>
+                <a:t>bias</a:t>
+              </a:r>
+            </a:p>
+          </p:txBody>
+        </p:sp>
+        <p:sp>
+          <p:nvSpPr>
+            <p:cNvPr id="14" name="TextBox 13">
+              <a:extLst>
+                <a:ext uri="{FF2B5EF4-FFF2-40B4-BE49-F238E27FC236}">
+                  <a16:creationId xmlns:a16="http://schemas.microsoft.com/office/drawing/2014/main" id="{9EB15D79-4B7D-4CCC-BAF5-749486D78297}"/>
+                </a:ext>
+              </a:extLst>
+            </p:cNvPr>
+            <p:cNvSpPr txBox="1"/>
+            <p:nvPr/>
+          </p:nvSpPr>
+          <p:spPr>
+            <a:xfrm>
+              <a:off x="1232429" y="4539198"/>
+              <a:ext cx="1114236" cy="450535"/>
+            </a:xfrm>
+            <a:prstGeom prst="rect">
+              <a:avLst/>
+            </a:prstGeom>
+            <a:noFill/>
+          </p:spPr>
+          <p:txBody>
+            <a:bodyPr wrap="square" rtlCol="0">
+              <a:spAutoFit/>
+            </a:bodyPr>
+            <a:lstStyle/>
+            <a:p>
+              <a:r>
+                <a:rPr lang="en-US" sz="1600" b="1" dirty="0"/>
+                <a:t>variance</a:t>
+              </a:r>
+            </a:p>
+          </p:txBody>
+        </p:sp>
+        <p:sp>
+          <p:nvSpPr>
+            <p:cNvPr id="15" name="TextBox 14">
+              <a:extLst>
+                <a:ext uri="{FF2B5EF4-FFF2-40B4-BE49-F238E27FC236}">
+                  <a16:creationId xmlns:a16="http://schemas.microsoft.com/office/drawing/2014/main" id="{B84F2745-3611-4B2B-82BC-335B13FF8483}"/>
+                </a:ext>
+              </a:extLst>
+            </p:cNvPr>
+            <p:cNvSpPr txBox="1"/>
+            <p:nvPr/>
+          </p:nvSpPr>
+          <p:spPr>
+            <a:xfrm>
+              <a:off x="6277631" y="4566000"/>
+              <a:ext cx="1114236" cy="450535"/>
+            </a:xfrm>
+            <a:prstGeom prst="rect">
+              <a:avLst/>
+            </a:prstGeom>
+            <a:noFill/>
+          </p:spPr>
+          <p:txBody>
+            <a:bodyPr wrap="square" rtlCol="0">
+              <a:spAutoFit/>
+            </a:bodyPr>
+            <a:lstStyle/>
+            <a:p>
+              <a:pPr algn="r"/>
+              <a:r>
+                <a:rPr lang="en-US" sz="1600" b="1" dirty="0"/>
+                <a:t>variance</a:t>
+              </a:r>
+            </a:p>
+          </p:txBody>
+        </p:sp>
+        <p:sp>
+          <p:nvSpPr>
+            <p:cNvPr id="7" name="Rectangle 6">
+              <a:extLst>
+                <a:ext uri="{FF2B5EF4-FFF2-40B4-BE49-F238E27FC236}">
+                  <a16:creationId xmlns:a16="http://schemas.microsoft.com/office/drawing/2014/main" id="{F84607F5-B3BB-44DF-A633-AE7EE27877F4}"/>
+                </a:ext>
+              </a:extLst>
+            </p:cNvPr>
+            <p:cNvSpPr/>
+            <p:nvPr/>
+          </p:nvSpPr>
+          <p:spPr>
+            <a:xfrm>
+              <a:off x="3144845" y="5150953"/>
+              <a:ext cx="2135516" cy="491493"/>
+            </a:xfrm>
+            <a:prstGeom prst="rect">
+              <a:avLst/>
+            </a:prstGeom>
+          </p:spPr>
+          <p:txBody>
+            <a:bodyPr wrap="none">
+              <a:spAutoFit/>
+            </a:bodyPr>
+            <a:lstStyle/>
+            <a:p>
+              <a:r>
+                <a:rPr lang="en-US" sz="1800" dirty="0"/>
+                <a:t>tuning parameters</a:t>
+              </a:r>
+            </a:p>
+          </p:txBody>
+        </p:sp>
+      </p:grpSp>
       <p:sp>
         <p:nvSpPr>
-          <p:cNvPr id="2" name="TextBox 1">
+          <p:cNvPr id="5" name="TextBox 4">
             <a:extLst>
               <a:ext uri="{FF2B5EF4-FFF2-40B4-BE49-F238E27FC236}">
-                <a16:creationId xmlns:a16="http://schemas.microsoft.com/office/drawing/2014/main" id="{3A5DBC26-7440-4310-878C-EABC6AE57D06}"/>
+                <a16:creationId xmlns:a16="http://schemas.microsoft.com/office/drawing/2014/main" id="{FF078D7A-8502-0616-B175-F5A1BD224A76}"/>
               </a:ext>
             </a:extLst>
           </p:cNvPr>
@@ -24657,8 +25857,250 @@
         </p:nvSpPr>
         <p:spPr>
           <a:xfrm>
-            <a:off x="982327" y="1672944"/>
-            <a:ext cx="10359866" cy="3539430"/>
+            <a:off x="1039640" y="1553261"/>
+            <a:ext cx="10875191" cy="3170099"/>
+          </a:xfrm>
+          <a:prstGeom prst="rect">
+            <a:avLst/>
+          </a:prstGeom>
+          <a:noFill/>
+        </p:spPr>
+        <p:txBody>
+          <a:bodyPr wrap="square">
+            <a:spAutoFit/>
+          </a:bodyPr>
+          <a:lstStyle/>
+          <a:p>
+            <a:r>
+              <a:rPr lang="en-US" sz="2000" b="1" dirty="0"/>
+              <a:t>Variance: </a:t>
+            </a:r>
+            <a:r>
+              <a:rPr lang="en-US" sz="2000" dirty="0"/>
+              <a:t>Error that occurs when the model too sensitive to training data. Model will make different predictions for same input data, depending on the specific training data that it was trained on. </a:t>
+            </a:r>
+          </a:p>
+          <a:p>
+            <a:endParaRPr lang="en-US" sz="2000" dirty="0"/>
+          </a:p>
+          <a:p>
+            <a:r>
+              <a:rPr lang="en-US" sz="2000" dirty="0"/>
+              <a:t>Why?</a:t>
+            </a:r>
+          </a:p>
+          <a:p>
+            <a:pPr marL="342900" indent="-342900">
+              <a:buFont typeface="Arial" panose="020B0604020202020204" pitchFamily="34" charset="0"/>
+              <a:buChar char="•"/>
+            </a:pPr>
+            <a:r>
+              <a:rPr lang="en-US" sz="2000" dirty="0"/>
+              <a:t>Model is too complex and overfits training data.</a:t>
+            </a:r>
+          </a:p>
+          <a:p>
+            <a:pPr marL="342900" indent="-342900">
+              <a:buFont typeface="Arial" panose="020B0604020202020204" pitchFamily="34" charset="0"/>
+              <a:buChar char="•"/>
+            </a:pPr>
+            <a:r>
+              <a:rPr lang="en-US" sz="2000" dirty="0"/>
+              <a:t>Training data noisy or contains outliers.</a:t>
+            </a:r>
+          </a:p>
+          <a:p>
+            <a:pPr marL="342900" indent="-342900">
+              <a:buFont typeface="Arial" panose="020B0604020202020204" pitchFamily="34" charset="0"/>
+              <a:buChar char="•"/>
+            </a:pPr>
+            <a:r>
+              <a:rPr lang="en-US" sz="2000" dirty="0"/>
+              <a:t>Model is not regularized enough</a:t>
+            </a:r>
+          </a:p>
+          <a:p>
+            <a:pPr lvl="1"/>
+            <a:r>
+              <a:rPr lang="en-US" sz="2000" dirty="0"/>
+              <a:t>(model will not generalize enough to new data. will likely to overfit; </a:t>
+            </a:r>
+          </a:p>
+          <a:p>
+            <a:pPr lvl="1"/>
+            <a:r>
+              <a:rPr lang="en-US" sz="2000" dirty="0"/>
+              <a:t>will learn specific patterns in training data too well)</a:t>
+            </a:r>
+          </a:p>
+        </p:txBody>
+      </p:sp>
+      <p:pic>
+        <p:nvPicPr>
+          <p:cNvPr id="3074" name="Picture 2">
+            <a:extLst>
+              <a:ext uri="{FF2B5EF4-FFF2-40B4-BE49-F238E27FC236}">
+                <a16:creationId xmlns:a16="http://schemas.microsoft.com/office/drawing/2014/main" id="{64D8F9D2-30D3-E641-9D46-9CD002E3B5A1}"/>
+              </a:ext>
+            </a:extLst>
+          </p:cNvPr>
+          <p:cNvPicPr>
+            <a:picLocks noChangeAspect="1" noChangeArrowheads="1"/>
+          </p:cNvPicPr>
+          <p:nvPr/>
+        </p:nvPicPr>
+        <p:blipFill>
+          <a:blip r:embed="rId3">
+            <a:extLst>
+              <a:ext uri="{BEBA8EAE-BF5A-486C-A8C5-ECC9F3942E4B}">
+                <a14:imgProps xmlns:a14="http://schemas.microsoft.com/office/drawing/2010/main">
+                  <a14:imgLayer r:embed="rId4">
+                    <a14:imgEffect>
+                      <a14:sharpenSoften amount="25000"/>
+                    </a14:imgEffect>
+                  </a14:imgLayer>
+                </a14:imgProps>
+              </a:ext>
+              <a:ext uri="{28A0092B-C50C-407E-A947-70E740481C1C}">
+                <a14:useLocalDpi xmlns:a14="http://schemas.microsoft.com/office/drawing/2010/main" val="0"/>
+              </a:ext>
+            </a:extLst>
+          </a:blip>
+          <a:srcRect/>
+          <a:stretch>
+            <a:fillRect/>
+          </a:stretch>
+        </p:blipFill>
+        <p:spPr bwMode="auto">
+          <a:xfrm>
+            <a:off x="8155867" y="2675380"/>
+            <a:ext cx="3289300" cy="609600"/>
+          </a:xfrm>
+          <a:prstGeom prst="rect">
+            <a:avLst/>
+          </a:prstGeom>
+          <a:noFill/>
+          <a:extLst>
+            <a:ext uri="{909E8E84-426E-40DD-AFC4-6F175D3DCCD1}">
+              <a14:hiddenFill xmlns:a14="http://schemas.microsoft.com/office/drawing/2010/main">
+                <a:solidFill>
+                  <a:srgbClr val="FFFFFF"/>
+                </a:solidFill>
+              </a14:hiddenFill>
+            </a:ext>
+          </a:extLst>
+        </p:spPr>
+      </p:pic>
+      <p:sp>
+        <p:nvSpPr>
+          <p:cNvPr id="3" name="TextBox 2">
+            <a:extLst>
+              <a:ext uri="{FF2B5EF4-FFF2-40B4-BE49-F238E27FC236}">
+                <a16:creationId xmlns:a16="http://schemas.microsoft.com/office/drawing/2014/main" id="{59681D64-C300-3E0C-2641-5DC942CE42EF}"/>
+              </a:ext>
+            </a:extLst>
+          </p:cNvPr>
+          <p:cNvSpPr txBox="1"/>
+          <p:nvPr/>
+        </p:nvSpPr>
+        <p:spPr>
+          <a:xfrm>
+            <a:off x="8319579" y="3140228"/>
+            <a:ext cx="3360420" cy="523220"/>
+          </a:xfrm>
+          <a:prstGeom prst="rect">
+            <a:avLst/>
+          </a:prstGeom>
+          <a:noFill/>
+        </p:spPr>
+        <p:txBody>
+          <a:bodyPr wrap="square">
+            <a:spAutoFit/>
+          </a:bodyPr>
+          <a:lstStyle/>
+          <a:p>
+            <a:pPr algn="ctr"/>
+            <a:r>
+              <a:rPr lang="en-US" sz="1400" b="0" i="0" dirty="0">
+                <a:solidFill>
+                  <a:schemeClr val="accent1"/>
+                </a:solidFill>
+                <a:effectLst/>
+                <a:latin typeface="source-serif-pro"/>
+              </a:rPr>
+              <a:t>Expectation of squared deviation of a random variable from its mean</a:t>
+            </a:r>
+            <a:endParaRPr lang="en-US" sz="1400" dirty="0">
+              <a:solidFill>
+                <a:schemeClr val="accent1"/>
+              </a:solidFill>
+            </a:endParaRPr>
+          </a:p>
+        </p:txBody>
+      </p:sp>
+      <p:pic>
+        <p:nvPicPr>
+          <p:cNvPr id="16" name="Picture 2" descr="Day 3 — K-Nearest Neighbors and Bias–Variance Tradeoff | by Tzu-Chi Lin |  30 days of Machine Learning | Medium">
+            <a:extLst>
+              <a:ext uri="{FF2B5EF4-FFF2-40B4-BE49-F238E27FC236}">
+                <a16:creationId xmlns:a16="http://schemas.microsoft.com/office/drawing/2014/main" id="{67BEEEBF-699A-6208-4E19-35A317CF73EF}"/>
+              </a:ext>
+            </a:extLst>
+          </p:cNvPr>
+          <p:cNvPicPr>
+            <a:picLocks noChangeAspect="1" noChangeArrowheads="1"/>
+          </p:cNvPicPr>
+          <p:nvPr/>
+        </p:nvPicPr>
+        <p:blipFill>
+          <a:blip r:embed="rId5">
+            <a:extLst>
+              <a:ext uri="{28A0092B-C50C-407E-A947-70E740481C1C}">
+                <a14:useLocalDpi xmlns:a14="http://schemas.microsoft.com/office/drawing/2010/main" val="0"/>
+              </a:ext>
+            </a:extLst>
+          </a:blip>
+          <a:srcRect/>
+          <a:stretch>
+            <a:fillRect/>
+          </a:stretch>
+        </p:blipFill>
+        <p:spPr bwMode="auto">
+          <a:xfrm>
+            <a:off x="8974751" y="3803480"/>
+            <a:ext cx="2470416" cy="2338525"/>
+          </a:xfrm>
+          <a:prstGeom prst="rect">
+            <a:avLst/>
+          </a:prstGeom>
+          <a:noFill/>
+          <a:extLst>
+            <a:ext uri="{909E8E84-426E-40DD-AFC4-6F175D3DCCD1}">
+              <a14:hiddenFill xmlns:a14="http://schemas.microsoft.com/office/drawing/2010/main">
+                <a:solidFill>
+                  <a:srgbClr val="FFFFFF"/>
+                </a:solidFill>
+              </a14:hiddenFill>
+            </a:ext>
+          </a:extLst>
+        </p:spPr>
+      </p:pic>
+      <p:sp>
+        <p:nvSpPr>
+          <p:cNvPr id="17" name="TextBox 16">
+            <a:extLst>
+              <a:ext uri="{FF2B5EF4-FFF2-40B4-BE49-F238E27FC236}">
+                <a16:creationId xmlns:a16="http://schemas.microsoft.com/office/drawing/2014/main" id="{221B6695-9742-27CF-5348-755E6B0910D1}"/>
+              </a:ext>
+            </a:extLst>
+          </p:cNvPr>
+          <p:cNvSpPr txBox="1"/>
+          <p:nvPr/>
+        </p:nvSpPr>
+        <p:spPr>
+          <a:xfrm>
+            <a:off x="8481743" y="6080226"/>
+            <a:ext cx="3456432" cy="507831"/>
           </a:xfrm>
           <a:prstGeom prst="rect">
             <a:avLst/>
@@ -24671,60 +26113,22 @@
           </a:bodyPr>
           <a:lstStyle/>
           <a:p>
-            <a:r>
-              <a:rPr lang="en-US" sz="2800" dirty="0"/>
-              <a:t>Increasing k in the </a:t>
-            </a:r>
-            <a:r>
-              <a:rPr lang="en-US" sz="2800" dirty="0" err="1"/>
-              <a:t>kNN</a:t>
-            </a:r>
-            <a:r>
-              <a:rPr lang="en-US" sz="2800" dirty="0"/>
-              <a:t> algorithm should have what effect on:</a:t>
-            </a:r>
-          </a:p>
-          <a:p>
-            <a:endParaRPr lang="en-US" sz="2800" dirty="0"/>
-          </a:p>
-          <a:p>
-            <a:endParaRPr lang="en-US" sz="2800" b="1" dirty="0"/>
-          </a:p>
-          <a:p>
-            <a:r>
-              <a:rPr lang="en-US" sz="2800" b="1" dirty="0"/>
-              <a:t>Bias: </a:t>
-            </a:r>
-            <a:r>
-              <a:rPr lang="en-US" sz="2800" dirty="0"/>
-              <a:t>Should </a:t>
-            </a:r>
-            <a:r>
-              <a:rPr lang="en-US" sz="2800" b="1" dirty="0">
+            <a:pPr algn="ctr"/>
+            <a:r>
+              <a:rPr lang="en-US" sz="900" dirty="0"/>
+              <a:t>center of the target (</a:t>
+            </a:r>
+            <a:r>
+              <a:rPr lang="en-US" sz="900" dirty="0">
                 <a:solidFill>
                   <a:srgbClr val="C00000"/>
                 </a:solidFill>
               </a:rPr>
-              <a:t>increase</a:t>
-            </a:r>
-            <a:r>
-              <a:rPr lang="en-US" sz="2800" dirty="0"/>
-              <a:t>. </a:t>
-            </a:r>
-          </a:p>
-          <a:p>
-            <a:endParaRPr lang="en-US" sz="2800" b="1" dirty="0"/>
-          </a:p>
-          <a:p>
-            <a:endParaRPr lang="en-US" sz="2800" b="1" dirty="0"/>
-          </a:p>
-          <a:p>
-            <a:endParaRPr lang="en-US" sz="2800" b="1" dirty="0"/>
-          </a:p>
-          <a:p>
-            <a:r>
-              <a:rPr lang="en-US" sz="2800" b="1" dirty="0"/>
-              <a:t>Variance: ?</a:t>
+              <a:t>red part</a:t>
+            </a:r>
+            <a:r>
+              <a:rPr lang="en-US" sz="900" dirty="0"/>
+              <a:t>) is the correct values of the data. As we move away from that region, the error becomes larger and larger.</a:t>
             </a:r>
           </a:p>
         </p:txBody>
@@ -24732,7 +26136,7 @@
     </p:spTree>
     <p:extLst>
       <p:ext uri="{BB962C8B-B14F-4D97-AF65-F5344CB8AC3E}">
-        <p14:creationId xmlns:p14="http://schemas.microsoft.com/office/powerpoint/2010/main" val="81509388"/>
+        <p14:creationId xmlns:p14="http://schemas.microsoft.com/office/powerpoint/2010/main" val="3525993213"/>
       </p:ext>
     </p:extLst>
   </p:cSld>
@@ -24773,11 +26177,7 @@
                                           </p:stCondLst>
                                         </p:cTn>
                                         <p:tgtEl>
-                                          <p:spTgt spid="2">
-                                            <p:txEl>
-                                              <p:pRg st="3" end="3"/>
-                                            </p:txEl>
-                                          </p:spTgt>
+                                          <p:spTgt spid="12"/>
                                         </p:tgtEl>
                                         <p:attrNameLst>
                                           <p:attrName>style.visibility</p:attrName>
@@ -24790,43 +26190,21 @@
                                   </p:childTnLst>
                                 </p:cTn>
                               </p:par>
-                            </p:childTnLst>
-                          </p:cTn>
-                        </p:par>
-                      </p:childTnLst>
-                    </p:cTn>
-                  </p:par>
-                  <p:par>
-                    <p:cTn id="7" fill="hold">
-                      <p:stCondLst>
-                        <p:cond delay="indefinite"/>
-                      </p:stCondLst>
-                      <p:childTnLst>
-                        <p:par>
-                          <p:cTn id="8" fill="hold">
-                            <p:stCondLst>
-                              <p:cond delay="0"/>
-                            </p:stCondLst>
-                            <p:childTnLst>
                               <p:par>
-                                <p:cTn id="9" presetID="1" presetClass="entr" presetSubtype="0" fill="hold" nodeType="clickEffect">
+                                <p:cTn id="7" presetID="1" presetClass="entr" presetSubtype="0" fill="hold" nodeType="withEffect">
                                   <p:stCondLst>
                                     <p:cond delay="0"/>
                                   </p:stCondLst>
                                   <p:childTnLst>
                                     <p:set>
                                       <p:cBhvr>
-                                        <p:cTn id="10" dur="1" fill="hold">
+                                        <p:cTn id="8" dur="1" fill="hold">
                                           <p:stCondLst>
                                             <p:cond delay="0"/>
                                           </p:stCondLst>
                                         </p:cTn>
                                         <p:tgtEl>
-                                          <p:spTgt spid="2">
-                                            <p:txEl>
-                                              <p:pRg st="7" end="7"/>
-                                            </p:txEl>
-                                          </p:spTgt>
+                                          <p:spTgt spid="16"/>
                                         </p:tgtEl>
                                         <p:attrNameLst>
                                           <p:attrName>style.visibility</p:attrName>
@@ -24918,23 +26296,7 @@
                   <a:srgbClr val="E46102"/>
                 </a:solidFill>
               </a:rPr>
-              <a:t>Discussion: </a:t>
-            </a:r>
-            <a:r>
-              <a:rPr lang="en-US" sz="4000" b="1" dirty="0" err="1">
-                <a:solidFill>
-                  <a:srgbClr val="E46102"/>
-                </a:solidFill>
-              </a:rPr>
-              <a:t>kNN</a:t>
-            </a:r>
-            <a:r>
-              <a:rPr lang="en-US" sz="4000" b="1" dirty="0">
-                <a:solidFill>
-                  <a:srgbClr val="E46102"/>
-                </a:solidFill>
-              </a:rPr>
-              <a:t> (Bias vs Variance)</a:t>
+              <a:t>Bias Variance Tradeoff</a:t>
             </a:r>
             <a:endParaRPr sz="4000" b="1" dirty="0">
               <a:solidFill>
@@ -24944,12 +26306,432 @@
           </a:p>
         </p:txBody>
       </p:sp>
+      <p:grpSp>
+        <p:nvGrpSpPr>
+          <p:cNvPr id="12" name="Group 11">
+            <a:extLst>
+              <a:ext uri="{FF2B5EF4-FFF2-40B4-BE49-F238E27FC236}">
+                <a16:creationId xmlns:a16="http://schemas.microsoft.com/office/drawing/2014/main" id="{30D615BB-915B-4EC7-9AA4-730DD380065B}"/>
+              </a:ext>
+            </a:extLst>
+          </p:cNvPr>
+          <p:cNvGrpSpPr/>
+          <p:nvPr/>
+        </p:nvGrpSpPr>
+        <p:grpSpPr>
+          <a:xfrm>
+            <a:off x="1072924" y="5294374"/>
+            <a:ext cx="6470876" cy="1337352"/>
+            <a:chOff x="1072924" y="3862747"/>
+            <a:chExt cx="6760104" cy="1779699"/>
+          </a:xfrm>
+        </p:grpSpPr>
+        <p:cxnSp>
+          <p:nvCxnSpPr>
+            <p:cNvPr id="4" name="Straight Arrow Connector 3">
+              <a:extLst>
+                <a:ext uri="{FF2B5EF4-FFF2-40B4-BE49-F238E27FC236}">
+                  <a16:creationId xmlns:a16="http://schemas.microsoft.com/office/drawing/2014/main" id="{3B4F5E36-3F1F-49BC-AFEB-CE6920AF77DE}"/>
+                </a:ext>
+              </a:extLst>
+            </p:cNvPr>
+            <p:cNvCxnSpPr/>
+            <p:nvPr/>
+          </p:nvCxnSpPr>
+          <p:spPr>
+            <a:xfrm>
+              <a:off x="1083958" y="5062506"/>
+              <a:ext cx="6467412" cy="0"/>
+            </a:xfrm>
+            <a:prstGeom prst="straightConnector1">
+              <a:avLst/>
+            </a:prstGeom>
+            <a:ln w="57150">
+              <a:headEnd type="triangle"/>
+              <a:tailEnd type="triangle"/>
+            </a:ln>
+            <a:effectLst/>
+          </p:spPr>
+          <p:style>
+            <a:lnRef idx="3">
+              <a:schemeClr val="accent1"/>
+            </a:lnRef>
+            <a:fillRef idx="0">
+              <a:schemeClr val="accent1"/>
+            </a:fillRef>
+            <a:effectRef idx="2">
+              <a:schemeClr val="accent1"/>
+            </a:effectRef>
+            <a:fontRef idx="minor">
+              <a:schemeClr val="tx1"/>
+            </a:fontRef>
+          </p:style>
+        </p:cxnSp>
+        <p:sp>
+          <p:nvSpPr>
+            <p:cNvPr id="8" name="Arrow: Right 7">
+              <a:extLst>
+                <a:ext uri="{FF2B5EF4-FFF2-40B4-BE49-F238E27FC236}">
+                  <a16:creationId xmlns:a16="http://schemas.microsoft.com/office/drawing/2014/main" id="{AC03E9E5-A9CC-4C59-B2BE-1F931738BD8D}"/>
+                </a:ext>
+              </a:extLst>
+            </p:cNvPr>
+            <p:cNvSpPr/>
+            <p:nvPr/>
+          </p:nvSpPr>
+          <p:spPr>
+            <a:xfrm rot="16200000">
+              <a:off x="966855" y="4551770"/>
+              <a:ext cx="362455" cy="150316"/>
+            </a:xfrm>
+            <a:prstGeom prst="rightArrow">
+              <a:avLst/>
+            </a:prstGeom>
+          </p:spPr>
+          <p:style>
+            <a:lnRef idx="2">
+              <a:schemeClr val="dk1">
+                <a:shade val="50000"/>
+              </a:schemeClr>
+            </a:lnRef>
+            <a:fillRef idx="1">
+              <a:schemeClr val="dk1"/>
+            </a:fillRef>
+            <a:effectRef idx="0">
+              <a:schemeClr val="dk1"/>
+            </a:effectRef>
+            <a:fontRef idx="minor">
+              <a:schemeClr val="lt1"/>
+            </a:fontRef>
+          </p:style>
+          <p:txBody>
+            <a:bodyPr rtlCol="0" anchor="ctr"/>
+            <a:lstStyle/>
+            <a:p>
+              <a:pPr algn="ctr"/>
+              <a:endParaRPr lang="en-US"/>
+            </a:p>
+          </p:txBody>
+        </p:sp>
+        <p:sp>
+          <p:nvSpPr>
+            <p:cNvPr id="9" name="Arrow: Right 8">
+              <a:extLst>
+                <a:ext uri="{FF2B5EF4-FFF2-40B4-BE49-F238E27FC236}">
+                  <a16:creationId xmlns:a16="http://schemas.microsoft.com/office/drawing/2014/main" id="{3763246C-E720-492C-85BC-07362804B2C2}"/>
+                </a:ext>
+              </a:extLst>
+            </p:cNvPr>
+            <p:cNvSpPr/>
+            <p:nvPr/>
+          </p:nvSpPr>
+          <p:spPr>
+            <a:xfrm rot="5400000">
+              <a:off x="958814" y="4101398"/>
+              <a:ext cx="362455" cy="134236"/>
+            </a:xfrm>
+            <a:prstGeom prst="rightArrow">
+              <a:avLst/>
+            </a:prstGeom>
+          </p:spPr>
+          <p:style>
+            <a:lnRef idx="2">
+              <a:schemeClr val="dk1">
+                <a:shade val="50000"/>
+              </a:schemeClr>
+            </a:lnRef>
+            <a:fillRef idx="1">
+              <a:schemeClr val="dk1"/>
+            </a:fillRef>
+            <a:effectRef idx="0">
+              <a:schemeClr val="dk1"/>
+            </a:effectRef>
+            <a:fontRef idx="minor">
+              <a:schemeClr val="lt1"/>
+            </a:fontRef>
+          </p:style>
+          <p:txBody>
+            <a:bodyPr rtlCol="0" anchor="ctr"/>
+            <a:lstStyle/>
+            <a:p>
+              <a:pPr algn="ctr"/>
+              <a:endParaRPr lang="en-US"/>
+            </a:p>
+          </p:txBody>
+        </p:sp>
+        <p:sp>
+          <p:nvSpPr>
+            <p:cNvPr id="10" name="Arrow: Right 9">
+              <a:extLst>
+                <a:ext uri="{FF2B5EF4-FFF2-40B4-BE49-F238E27FC236}">
+                  <a16:creationId xmlns:a16="http://schemas.microsoft.com/office/drawing/2014/main" id="{30AEB09C-A97F-41D7-B651-981A8F9A2E22}"/>
+                </a:ext>
+              </a:extLst>
+            </p:cNvPr>
+            <p:cNvSpPr/>
+            <p:nvPr/>
+          </p:nvSpPr>
+          <p:spPr>
+            <a:xfrm rot="5400000">
+              <a:off x="7294986" y="4563917"/>
+              <a:ext cx="362455" cy="150316"/>
+            </a:xfrm>
+            <a:prstGeom prst="rightArrow">
+              <a:avLst/>
+            </a:prstGeom>
+          </p:spPr>
+          <p:style>
+            <a:lnRef idx="2">
+              <a:schemeClr val="dk1">
+                <a:shade val="50000"/>
+              </a:schemeClr>
+            </a:lnRef>
+            <a:fillRef idx="1">
+              <a:schemeClr val="dk1"/>
+            </a:fillRef>
+            <a:effectRef idx="0">
+              <a:schemeClr val="dk1"/>
+            </a:effectRef>
+            <a:fontRef idx="minor">
+              <a:schemeClr val="lt1"/>
+            </a:fontRef>
+          </p:style>
+          <p:txBody>
+            <a:bodyPr rtlCol="0" anchor="ctr"/>
+            <a:lstStyle/>
+            <a:p>
+              <a:pPr algn="ctr"/>
+              <a:endParaRPr lang="en-US"/>
+            </a:p>
+          </p:txBody>
+        </p:sp>
+        <p:sp>
+          <p:nvSpPr>
+            <p:cNvPr id="11" name="Arrow: Right 10">
+              <a:extLst>
+                <a:ext uri="{FF2B5EF4-FFF2-40B4-BE49-F238E27FC236}">
+                  <a16:creationId xmlns:a16="http://schemas.microsoft.com/office/drawing/2014/main" id="{A2ED645B-7AA2-4E12-9C5C-94B215EA44C4}"/>
+                </a:ext>
+              </a:extLst>
+            </p:cNvPr>
+            <p:cNvSpPr/>
+            <p:nvPr/>
+          </p:nvSpPr>
+          <p:spPr>
+            <a:xfrm rot="16200000">
+              <a:off x="7286945" y="4113546"/>
+              <a:ext cx="362455" cy="134236"/>
+            </a:xfrm>
+            <a:prstGeom prst="rightArrow">
+              <a:avLst/>
+            </a:prstGeom>
+          </p:spPr>
+          <p:style>
+            <a:lnRef idx="2">
+              <a:schemeClr val="dk1">
+                <a:shade val="50000"/>
+              </a:schemeClr>
+            </a:lnRef>
+            <a:fillRef idx="1">
+              <a:schemeClr val="dk1"/>
+            </a:fillRef>
+            <a:effectRef idx="0">
+              <a:schemeClr val="dk1"/>
+            </a:effectRef>
+            <a:fontRef idx="minor">
+              <a:schemeClr val="lt1"/>
+            </a:fontRef>
+          </p:style>
+          <p:txBody>
+            <a:bodyPr rtlCol="0" anchor="ctr"/>
+            <a:lstStyle/>
+            <a:p>
+              <a:pPr algn="ctr"/>
+              <a:endParaRPr lang="en-US"/>
+            </a:p>
+          </p:txBody>
+        </p:sp>
+        <p:sp>
+          <p:nvSpPr>
+            <p:cNvPr id="6" name="TextBox 5">
+              <a:extLst>
+                <a:ext uri="{FF2B5EF4-FFF2-40B4-BE49-F238E27FC236}">
+                  <a16:creationId xmlns:a16="http://schemas.microsoft.com/office/drawing/2014/main" id="{21330036-9778-4B03-8260-A7120DCD58A2}"/>
+                </a:ext>
+              </a:extLst>
+            </p:cNvPr>
+            <p:cNvSpPr txBox="1"/>
+            <p:nvPr/>
+          </p:nvSpPr>
+          <p:spPr>
+            <a:xfrm>
+              <a:off x="1207160" y="3862747"/>
+              <a:ext cx="1114236" cy="369332"/>
+            </a:xfrm>
+            <a:prstGeom prst="rect">
+              <a:avLst/>
+            </a:prstGeom>
+            <a:noFill/>
+          </p:spPr>
+          <p:txBody>
+            <a:bodyPr wrap="square" rtlCol="0">
+              <a:spAutoFit/>
+            </a:bodyPr>
+            <a:lstStyle/>
+            <a:p>
+              <a:r>
+                <a:rPr lang="en-US" sz="1800" b="1" dirty="0"/>
+                <a:t>bias</a:t>
+              </a:r>
+            </a:p>
+          </p:txBody>
+        </p:sp>
+        <p:sp>
+          <p:nvSpPr>
+            <p:cNvPr id="13" name="TextBox 12">
+              <a:extLst>
+                <a:ext uri="{FF2B5EF4-FFF2-40B4-BE49-F238E27FC236}">
+                  <a16:creationId xmlns:a16="http://schemas.microsoft.com/office/drawing/2014/main" id="{203B3BD6-BF57-40B0-8024-BBCB52DD0642}"/>
+                </a:ext>
+              </a:extLst>
+            </p:cNvPr>
+            <p:cNvSpPr txBox="1"/>
+            <p:nvPr/>
+          </p:nvSpPr>
+          <p:spPr>
+            <a:xfrm>
+              <a:off x="6718792" y="3862747"/>
+              <a:ext cx="1114236" cy="369332"/>
+            </a:xfrm>
+            <a:prstGeom prst="rect">
+              <a:avLst/>
+            </a:prstGeom>
+            <a:noFill/>
+          </p:spPr>
+          <p:txBody>
+            <a:bodyPr wrap="square" rtlCol="0">
+              <a:spAutoFit/>
+            </a:bodyPr>
+            <a:lstStyle/>
+            <a:p>
+              <a:r>
+                <a:rPr lang="en-US" sz="1800" b="1" dirty="0"/>
+                <a:t>bias</a:t>
+              </a:r>
+            </a:p>
+          </p:txBody>
+        </p:sp>
+        <p:sp>
+          <p:nvSpPr>
+            <p:cNvPr id="14" name="TextBox 13">
+              <a:extLst>
+                <a:ext uri="{FF2B5EF4-FFF2-40B4-BE49-F238E27FC236}">
+                  <a16:creationId xmlns:a16="http://schemas.microsoft.com/office/drawing/2014/main" id="{9EB15D79-4B7D-4CCC-BAF5-749486D78297}"/>
+                </a:ext>
+              </a:extLst>
+            </p:cNvPr>
+            <p:cNvSpPr txBox="1"/>
+            <p:nvPr/>
+          </p:nvSpPr>
+          <p:spPr>
+            <a:xfrm>
+              <a:off x="1232429" y="4539198"/>
+              <a:ext cx="1114236" cy="369332"/>
+            </a:xfrm>
+            <a:prstGeom prst="rect">
+              <a:avLst/>
+            </a:prstGeom>
+            <a:noFill/>
+          </p:spPr>
+          <p:txBody>
+            <a:bodyPr wrap="square" rtlCol="0">
+              <a:spAutoFit/>
+            </a:bodyPr>
+            <a:lstStyle/>
+            <a:p>
+              <a:r>
+                <a:rPr lang="en-US" sz="1800" b="1" dirty="0"/>
+                <a:t>variance</a:t>
+              </a:r>
+            </a:p>
+          </p:txBody>
+        </p:sp>
+        <p:sp>
+          <p:nvSpPr>
+            <p:cNvPr id="15" name="TextBox 14">
+              <a:extLst>
+                <a:ext uri="{FF2B5EF4-FFF2-40B4-BE49-F238E27FC236}">
+                  <a16:creationId xmlns:a16="http://schemas.microsoft.com/office/drawing/2014/main" id="{B84F2745-3611-4B2B-82BC-335B13FF8483}"/>
+                </a:ext>
+              </a:extLst>
+            </p:cNvPr>
+            <p:cNvSpPr txBox="1"/>
+            <p:nvPr/>
+          </p:nvSpPr>
+          <p:spPr>
+            <a:xfrm>
+              <a:off x="6277631" y="4565999"/>
+              <a:ext cx="1114236" cy="369332"/>
+            </a:xfrm>
+            <a:prstGeom prst="rect">
+              <a:avLst/>
+            </a:prstGeom>
+            <a:noFill/>
+          </p:spPr>
+          <p:txBody>
+            <a:bodyPr wrap="square" rtlCol="0">
+              <a:spAutoFit/>
+            </a:bodyPr>
+            <a:lstStyle/>
+            <a:p>
+              <a:r>
+                <a:rPr lang="en-US" sz="1800" b="1" dirty="0"/>
+                <a:t>variance</a:t>
+              </a:r>
+            </a:p>
+          </p:txBody>
+        </p:sp>
+        <p:sp>
+          <p:nvSpPr>
+            <p:cNvPr id="7" name="Rectangle 6">
+              <a:extLst>
+                <a:ext uri="{FF2B5EF4-FFF2-40B4-BE49-F238E27FC236}">
+                  <a16:creationId xmlns:a16="http://schemas.microsoft.com/office/drawing/2014/main" id="{F84607F5-B3BB-44DF-A633-AE7EE27877F4}"/>
+                </a:ext>
+              </a:extLst>
+            </p:cNvPr>
+            <p:cNvSpPr/>
+            <p:nvPr/>
+          </p:nvSpPr>
+          <p:spPr>
+            <a:xfrm>
+              <a:off x="3144845" y="5150953"/>
+              <a:ext cx="2135516" cy="491493"/>
+            </a:xfrm>
+            <a:prstGeom prst="rect">
+              <a:avLst/>
+            </a:prstGeom>
+          </p:spPr>
+          <p:txBody>
+            <a:bodyPr wrap="none">
+              <a:spAutoFit/>
+            </a:bodyPr>
+            <a:lstStyle/>
+            <a:p>
+              <a:r>
+                <a:rPr lang="en-US" sz="1800" dirty="0"/>
+                <a:t>tuning parameters</a:t>
+              </a:r>
+            </a:p>
+          </p:txBody>
+        </p:sp>
+      </p:grpSp>
       <p:sp>
         <p:nvSpPr>
-          <p:cNvPr id="2" name="TextBox 1">
+          <p:cNvPr id="5" name="TextBox 4">
             <a:extLst>
               <a:ext uri="{FF2B5EF4-FFF2-40B4-BE49-F238E27FC236}">
-                <a16:creationId xmlns:a16="http://schemas.microsoft.com/office/drawing/2014/main" id="{3A5DBC26-7440-4310-878C-EABC6AE57D06}"/>
+                <a16:creationId xmlns:a16="http://schemas.microsoft.com/office/drawing/2014/main" id="{FF078D7A-8502-0616-B175-F5A1BD224A76}"/>
               </a:ext>
             </a:extLst>
           </p:cNvPr>
@@ -24958,8 +26740,117 @@
         </p:nvSpPr>
         <p:spPr>
           <a:xfrm>
-            <a:off x="982327" y="1672944"/>
-            <a:ext cx="10359866" cy="3539430"/>
+            <a:off x="1039641" y="1553261"/>
+            <a:ext cx="10097752" cy="2246769"/>
+          </a:xfrm>
+          <a:prstGeom prst="rect">
+            <a:avLst/>
+          </a:prstGeom>
+          <a:noFill/>
+        </p:spPr>
+        <p:txBody>
+          <a:bodyPr wrap="square">
+            <a:spAutoFit/>
+          </a:bodyPr>
+          <a:lstStyle/>
+          <a:p>
+            <a:r>
+              <a:rPr lang="en-US" sz="2000" b="1" dirty="0"/>
+              <a:t>Bias-variance trade-off </a:t>
+            </a:r>
+            <a:r>
+              <a:rPr lang="en-US" sz="2000" dirty="0"/>
+              <a:t>: </a:t>
+            </a:r>
+            <a:r>
+              <a:rPr lang="en-US" sz="2000" i="1" dirty="0"/>
+              <a:t>Impossible</a:t>
+            </a:r>
+            <a:r>
+              <a:rPr lang="en-US" sz="2000" dirty="0"/>
+              <a:t> to have a model with both low bias and low variance. </a:t>
+            </a:r>
+          </a:p>
+          <a:p>
+            <a:endParaRPr lang="en-US" sz="2000" dirty="0"/>
+          </a:p>
+          <a:p>
+            <a:r>
+              <a:rPr lang="en-US" sz="2000" dirty="0"/>
+              <a:t>Why? </a:t>
+            </a:r>
+          </a:p>
+          <a:p>
+            <a:r>
+              <a:rPr lang="en-US" sz="2000" dirty="0"/>
+              <a:t>If you reduce the bias of a model, you will increase the variance, and vice versa. This is because more complex models can learn more complex patterns in the data, but they are also more sensitive to noise and outliers.</a:t>
+            </a:r>
+          </a:p>
+        </p:txBody>
+      </p:sp>
+      <p:pic>
+        <p:nvPicPr>
+          <p:cNvPr id="2" name="Picture 2" descr="Day 3 — K-Nearest Neighbors and Bias–Variance Tradeoff | by Tzu-Chi Lin |  30 days of Machine Learning | Medium">
+            <a:extLst>
+              <a:ext uri="{FF2B5EF4-FFF2-40B4-BE49-F238E27FC236}">
+                <a16:creationId xmlns:a16="http://schemas.microsoft.com/office/drawing/2014/main" id="{F7DA0102-93A3-7015-DC67-EE89847BED44}"/>
+              </a:ext>
+            </a:extLst>
+          </p:cNvPr>
+          <p:cNvPicPr>
+            <a:picLocks noChangeAspect="1" noChangeArrowheads="1"/>
+          </p:cNvPicPr>
+          <p:nvPr/>
+        </p:nvPicPr>
+        <p:blipFill>
+          <a:blip r:embed="rId3">
+            <a:extLst>
+              <a:ext uri="{28A0092B-C50C-407E-A947-70E740481C1C}">
+                <a14:useLocalDpi xmlns:a14="http://schemas.microsoft.com/office/drawing/2010/main" val="0"/>
+              </a:ext>
+            </a:extLst>
+          </a:blip>
+          <a:srcRect/>
+          <a:stretch>
+            <a:fillRect/>
+          </a:stretch>
+        </p:blipFill>
+        <p:spPr bwMode="auto">
+          <a:xfrm>
+            <a:off x="8974751" y="3803480"/>
+            <a:ext cx="2470416" cy="2338525"/>
+          </a:xfrm>
+          <a:prstGeom prst="rect">
+            <a:avLst/>
+          </a:prstGeom>
+          <a:noFill/>
+          <a:extLst>
+            <a:ext uri="{909E8E84-426E-40DD-AFC4-6F175D3DCCD1}">
+              <a14:hiddenFill xmlns:a14="http://schemas.microsoft.com/office/drawing/2010/main">
+                <a:solidFill>
+                  <a:srgbClr val="FFFFFF"/>
+                </a:solidFill>
+              </a14:hiddenFill>
+            </a:ext>
+          </a:extLst>
+        </p:spPr>
+      </p:pic>
+      <p:sp>
+        <p:nvSpPr>
+          <p:cNvPr id="3" name="TextBox 2">
+            <a:extLst>
+              <a:ext uri="{FF2B5EF4-FFF2-40B4-BE49-F238E27FC236}">
+                <a16:creationId xmlns:a16="http://schemas.microsoft.com/office/drawing/2014/main" id="{F553E8FA-1DE3-B711-E133-08FA9F4F5949}"/>
+              </a:ext>
+            </a:extLst>
+          </p:cNvPr>
+          <p:cNvSpPr txBox="1"/>
+          <p:nvPr/>
+        </p:nvSpPr>
+        <p:spPr>
+          <a:xfrm>
+            <a:off x="8481743" y="6080226"/>
+            <a:ext cx="3456432" cy="507831"/>
           </a:xfrm>
           <a:prstGeom prst="rect">
             <a:avLst/>
@@ -24972,72 +26863,22 @@
           </a:bodyPr>
           <a:lstStyle/>
           <a:p>
-            <a:r>
-              <a:rPr lang="en-US" sz="2800" dirty="0"/>
-              <a:t>Increasing k in the </a:t>
-            </a:r>
-            <a:r>
-              <a:rPr lang="en-US" sz="2800" dirty="0" err="1"/>
-              <a:t>kNN</a:t>
-            </a:r>
-            <a:r>
-              <a:rPr lang="en-US" sz="2800" dirty="0"/>
-              <a:t> algorithm should have what effect on:</a:t>
-            </a:r>
-          </a:p>
-          <a:p>
-            <a:endParaRPr lang="en-US" sz="2800" dirty="0"/>
-          </a:p>
-          <a:p>
-            <a:endParaRPr lang="en-US" sz="2800" b="1" dirty="0"/>
-          </a:p>
-          <a:p>
-            <a:r>
-              <a:rPr lang="en-US" sz="2800" b="1" dirty="0"/>
-              <a:t>Bias: </a:t>
-            </a:r>
-            <a:r>
-              <a:rPr lang="en-US" sz="2800" dirty="0"/>
-              <a:t>Should </a:t>
-            </a:r>
-            <a:r>
-              <a:rPr lang="en-US" sz="2800" b="1" dirty="0">
+            <a:pPr algn="ctr"/>
+            <a:r>
+              <a:rPr lang="en-US" sz="900" dirty="0"/>
+              <a:t>center of the target (</a:t>
+            </a:r>
+            <a:r>
+              <a:rPr lang="en-US" sz="900" dirty="0">
                 <a:solidFill>
                   <a:srgbClr val="C00000"/>
                 </a:solidFill>
               </a:rPr>
-              <a:t>increase</a:t>
-            </a:r>
-            <a:r>
-              <a:rPr lang="en-US" sz="2800" dirty="0"/>
-              <a:t>. </a:t>
-            </a:r>
-          </a:p>
-          <a:p>
-            <a:endParaRPr lang="en-US" sz="2800" b="1" dirty="0"/>
-          </a:p>
-          <a:p>
-            <a:endParaRPr lang="en-US" sz="2800" b="1" dirty="0"/>
-          </a:p>
-          <a:p>
-            <a:endParaRPr lang="en-US" sz="2800" b="1" dirty="0"/>
-          </a:p>
-          <a:p>
-            <a:r>
-              <a:rPr lang="en-US" sz="2800" b="1" dirty="0"/>
-              <a:t>Variance: </a:t>
-            </a:r>
-            <a:r>
-              <a:rPr lang="en-US" sz="2800" dirty="0"/>
-              <a:t>Should </a:t>
-            </a:r>
-            <a:r>
-              <a:rPr lang="en-US" sz="2800" b="1" dirty="0">
-                <a:solidFill>
-                  <a:srgbClr val="C00000"/>
-                </a:solidFill>
-              </a:rPr>
-              <a:t>decrease</a:t>
+              <a:t>red part</a:t>
+            </a:r>
+            <a:r>
+              <a:rPr lang="en-US" sz="900" dirty="0"/>
+              <a:t>) is the correct values of the data. As we move away from that region, the error becomes larger and larger.</a:t>
             </a:r>
           </a:p>
         </p:txBody>
@@ -25045,13 +26886,115 @@
     </p:spTree>
     <p:extLst>
       <p:ext uri="{BB962C8B-B14F-4D97-AF65-F5344CB8AC3E}">
-        <p14:creationId xmlns:p14="http://schemas.microsoft.com/office/powerpoint/2010/main" val="3582657331"/>
+        <p14:creationId xmlns:p14="http://schemas.microsoft.com/office/powerpoint/2010/main" val="2333814169"/>
       </p:ext>
     </p:extLst>
   </p:cSld>
   <p:clrMapOvr>
     <a:masterClrMapping/>
   </p:clrMapOvr>
+  <p:timing>
+    <p:tnLst>
+      <p:par>
+        <p:cTn id="1" dur="indefinite" restart="never" nodeType="tmRoot">
+          <p:childTnLst>
+            <p:seq concurrent="1" nextAc="seek">
+              <p:cTn id="2" dur="indefinite" nodeType="mainSeq">
+                <p:childTnLst>
+                  <p:par>
+                    <p:cTn id="3" fill="hold">
+                      <p:stCondLst>
+                        <p:cond delay="indefinite"/>
+                      </p:stCondLst>
+                      <p:childTnLst>
+                        <p:par>
+                          <p:cTn id="4" fill="hold">
+                            <p:stCondLst>
+                              <p:cond delay="0"/>
+                            </p:stCondLst>
+                            <p:childTnLst>
+                              <p:par>
+                                <p:cTn id="5" presetID="1" presetClass="entr" presetSubtype="0" fill="hold" nodeType="clickEffect">
+                                  <p:stCondLst>
+                                    <p:cond delay="0"/>
+                                  </p:stCondLst>
+                                  <p:childTnLst>
+                                    <p:set>
+                                      <p:cBhvr>
+                                        <p:cTn id="6" dur="1" fill="hold">
+                                          <p:stCondLst>
+                                            <p:cond delay="0"/>
+                                          </p:stCondLst>
+                                        </p:cTn>
+                                        <p:tgtEl>
+                                          <p:spTgt spid="12"/>
+                                        </p:tgtEl>
+                                        <p:attrNameLst>
+                                          <p:attrName>style.visibility</p:attrName>
+                                        </p:attrNameLst>
+                                      </p:cBhvr>
+                                      <p:to>
+                                        <p:strVal val="visible"/>
+                                      </p:to>
+                                    </p:set>
+                                  </p:childTnLst>
+                                </p:cTn>
+                              </p:par>
+                              <p:par>
+                                <p:cTn id="7" presetID="1" presetClass="entr" presetSubtype="0" fill="hold" nodeType="withEffect">
+                                  <p:stCondLst>
+                                    <p:cond delay="0"/>
+                                  </p:stCondLst>
+                                  <p:childTnLst>
+                                    <p:set>
+                                      <p:cBhvr>
+                                        <p:cTn id="8" dur="1" fill="hold">
+                                          <p:stCondLst>
+                                            <p:cond delay="0"/>
+                                          </p:stCondLst>
+                                        </p:cTn>
+                                        <p:tgtEl>
+                                          <p:spTgt spid="2"/>
+                                        </p:tgtEl>
+                                        <p:attrNameLst>
+                                          <p:attrName>style.visibility</p:attrName>
+                                        </p:attrNameLst>
+                                      </p:cBhvr>
+                                      <p:to>
+                                        <p:strVal val="visible"/>
+                                      </p:to>
+                                    </p:set>
+                                  </p:childTnLst>
+                                </p:cTn>
+                              </p:par>
+                            </p:childTnLst>
+                          </p:cTn>
+                        </p:par>
+                      </p:childTnLst>
+                    </p:cTn>
+                  </p:par>
+                </p:childTnLst>
+              </p:cTn>
+              <p:prevCondLst>
+                <p:cond evt="onPrev" delay="0">
+                  <p:tgtEl>
+                    <p:sldTgt/>
+                  </p:tgtEl>
+                </p:cond>
+              </p:prevCondLst>
+              <p:nextCondLst>
+                <p:cond evt="onNext" delay="0">
+                  <p:tgtEl>
+                    <p:sldTgt/>
+                  </p:tgtEl>
+                </p:cond>
+              </p:nextCondLst>
+            </p:seq>
+          </p:childTnLst>
+        </p:cTn>
+      </p:par>
+    </p:tnLst>
+  </p:timing>
 </p:sld>
 </file>
 
@@ -25143,8 +27086,8 @@
         </p:nvSpPr>
         <p:spPr>
           <a:xfrm>
-            <a:off x="982327" y="1672944"/>
-            <a:ext cx="10359866" cy="3108543"/>
+            <a:off x="717173" y="1874728"/>
+            <a:ext cx="10972800" cy="3108543"/>
           </a:xfrm>
           <a:prstGeom prst="rect">
             <a:avLst/>
@@ -25159,28 +27102,81 @@
           <a:p>
             <a:r>
               <a:rPr lang="en-US" sz="2800" dirty="0"/>
-              <a:t>Compared to simpler (fewer parameters), complex models have what kind of Bias and Variance?:</a:t>
-            </a:r>
-          </a:p>
-          <a:p>
-            <a:endParaRPr lang="en-US" sz="2800" b="1" dirty="0"/>
-          </a:p>
-          <a:p>
+              <a:t>What is the best </a:t>
+            </a:r>
             <a:r>
               <a:rPr lang="en-US" sz="2800" b="1" dirty="0"/>
-              <a:t>Bias: ?</a:t>
-            </a:r>
-          </a:p>
-          <a:p>
-            <a:endParaRPr lang="en-US" sz="2800" b="1" dirty="0"/>
-          </a:p>
-          <a:p>
-            <a:endParaRPr lang="en-US" sz="2800" b="1" dirty="0"/>
-          </a:p>
-          <a:p>
+              <a:t>distance</a:t>
+            </a:r>
+            <a:r>
+              <a:rPr lang="en-US" sz="2800" dirty="0"/>
+              <a:t> to use?</a:t>
+            </a:r>
+          </a:p>
+          <a:p>
+            <a:r>
+              <a:rPr lang="en-US" sz="2800" dirty="0"/>
+              <a:t>What is the best value of </a:t>
+            </a:r>
             <a:r>
               <a:rPr lang="en-US" sz="2800" b="1" dirty="0"/>
-              <a:t>Variance:?</a:t>
+              <a:t>k</a:t>
+            </a:r>
+            <a:r>
+              <a:rPr lang="en-US" sz="2800" dirty="0"/>
+              <a:t> to use?</a:t>
+            </a:r>
+          </a:p>
+          <a:p>
+            <a:endParaRPr lang="en-US" sz="2800" dirty="0"/>
+          </a:p>
+          <a:p>
+            <a:r>
+              <a:rPr lang="en-US" sz="2800" dirty="0"/>
+              <a:t>i.e. how do we set the </a:t>
+            </a:r>
+            <a:r>
+              <a:rPr lang="en-US" sz="2800" b="1" dirty="0"/>
+              <a:t>hyperparameters</a:t>
+            </a:r>
+            <a:r>
+              <a:rPr lang="en-US" sz="2800" dirty="0"/>
+              <a:t>?</a:t>
+            </a:r>
+          </a:p>
+          <a:p>
+            <a:endParaRPr lang="en-US" sz="2800" dirty="0"/>
+          </a:p>
+          <a:p>
+            <a:pPr>
+              <a:buClr>
+                <a:schemeClr val="dk1"/>
+              </a:buClr>
+              <a:buSzPct val="45833"/>
+            </a:pPr>
+            <a:r>
+              <a:rPr lang="en-US" sz="2800" dirty="0">
+                <a:solidFill>
+                  <a:srgbClr val="38761D"/>
+                </a:solidFill>
+              </a:rPr>
+              <a:t>Very problem-dependent. </a:t>
+            </a:r>
+          </a:p>
+          <a:p>
+            <a:pPr>
+              <a:buClr>
+                <a:schemeClr val="dk1"/>
+              </a:buClr>
+              <a:buSzPct val="45833"/>
+            </a:pPr>
+            <a:r>
+              <a:rPr lang="en-US" sz="2800" dirty="0">
+                <a:solidFill>
+                  <a:srgbClr val="38761D"/>
+                </a:solidFill>
+              </a:rPr>
+              <a:t>Must try them all out and see what works best.</a:t>
             </a:r>
           </a:p>
         </p:txBody>
@@ -25188,7 +27184,7 @@
     </p:spTree>
     <p:extLst>
       <p:ext uri="{BB962C8B-B14F-4D97-AF65-F5344CB8AC3E}">
-        <p14:creationId xmlns:p14="http://schemas.microsoft.com/office/powerpoint/2010/main" val="3997439919"/>
+        <p14:creationId xmlns:p14="http://schemas.microsoft.com/office/powerpoint/2010/main" val="2606690237"/>
       </p:ext>
     </p:extLst>
   </p:cSld>
@@ -25246,23 +27242,7 @@
                   <a:srgbClr val="E46102"/>
                 </a:solidFill>
               </a:rPr>
-              <a:t>Discussion: </a:t>
-            </a:r>
-            <a:r>
-              <a:rPr lang="en-US" sz="4000" b="1" dirty="0" err="1">
-                <a:solidFill>
-                  <a:srgbClr val="E46102"/>
-                </a:solidFill>
-              </a:rPr>
-              <a:t>kNN</a:t>
-            </a:r>
-            <a:r>
-              <a:rPr lang="en-US" sz="4000" b="1" dirty="0">
-                <a:solidFill>
-                  <a:srgbClr val="E46102"/>
-                </a:solidFill>
-              </a:rPr>
-              <a:t> (Bias vs Variance)</a:t>
+              <a:t>Example Exercise</a:t>
             </a:r>
             <a:endParaRPr sz="4000" b="1" dirty="0">
               <a:solidFill>
@@ -25286,8 +27266,8 @@
         </p:nvSpPr>
         <p:spPr>
           <a:xfrm>
-            <a:off x="982327" y="1672944"/>
-            <a:ext cx="10359866" cy="3108543"/>
+            <a:off x="717173" y="2459944"/>
+            <a:ext cx="10972800" cy="1015663"/>
           </a:xfrm>
           <a:prstGeom prst="rect">
             <a:avLst/>
@@ -25300,40 +27280,48 @@
           </a:bodyPr>
           <a:lstStyle/>
           <a:p>
-            <a:r>
-              <a:rPr lang="en-US" sz="2800" dirty="0"/>
-              <a:t>Compared to simpler (fewer parameters), complex models have what kind of Bias and Variance?:</a:t>
-            </a:r>
-          </a:p>
-          <a:p>
-            <a:endParaRPr lang="en-US" sz="2800" b="1" dirty="0"/>
-          </a:p>
-          <a:p>
-            <a:r>
-              <a:rPr lang="en-US" sz="2800" b="1" dirty="0"/>
-              <a:t>Bias: ? </a:t>
-            </a:r>
-            <a:r>
-              <a:rPr lang="en-US" sz="2800" b="1" dirty="0">
+            <a:pPr algn="ctr"/>
+            <a:r>
+              <a:rPr lang="en-US" sz="2000" b="1" i="0" dirty="0">
                 <a:solidFill>
-                  <a:srgbClr val="C00000"/>
+                  <a:srgbClr val="242424"/>
                 </a:solidFill>
+                <a:effectLst/>
+                <a:latin typeface="sohne"/>
               </a:rPr>
-              <a:t>Lower</a:t>
-            </a:r>
-            <a:r>
-              <a:rPr lang="en-US" sz="2800" dirty="0"/>
-              <a:t>, because complex models can better model local variation. </a:t>
-            </a:r>
-            <a:endParaRPr lang="en-US" sz="2800" b="1" dirty="0"/>
-          </a:p>
-          <a:p>
-            <a:endParaRPr lang="en-US" sz="2800" b="1" dirty="0"/>
-          </a:p>
-          <a:p>
-            <a:r>
-              <a:rPr lang="en-US" sz="2800" b="1" dirty="0"/>
-              <a:t>Variance:?</a:t>
+              <a:t>C</a:t>
+            </a:r>
+            <a:r>
+              <a:rPr lang="en-US" sz="2000" b="1" i="0" dirty="0">
+                <a:solidFill>
+                  <a:srgbClr val="242424"/>
+                </a:solidFill>
+                <a:effectLst/>
+                <a:latin typeface="source-serif-pro"/>
+              </a:rPr>
+              <a:t>onsider an extreme case, K=1, what will it happen?</a:t>
+            </a:r>
+          </a:p>
+          <a:p>
+            <a:pPr algn="ctr"/>
+            <a:endParaRPr lang="en-US" sz="2000" b="1" dirty="0">
+              <a:solidFill>
+                <a:srgbClr val="242424"/>
+              </a:solidFill>
+              <a:latin typeface="source-serif-pro"/>
+            </a:endParaRPr>
+          </a:p>
+          <a:p>
+            <a:pPr algn="ctr"/>
+            <a:r>
+              <a:rPr lang="en-US" sz="2000" b="1" i="0" dirty="0">
+                <a:solidFill>
+                  <a:srgbClr val="242424"/>
+                </a:solidFill>
+                <a:effectLst/>
+                <a:latin typeface="source-serif-pro"/>
+              </a:rPr>
+              <a:t>What happens when we increase K? </a:t>
             </a:r>
           </a:p>
         </p:txBody>
@@ -25341,123 +27329,13 @@
     </p:spTree>
     <p:extLst>
       <p:ext uri="{BB962C8B-B14F-4D97-AF65-F5344CB8AC3E}">
-        <p14:creationId xmlns:p14="http://schemas.microsoft.com/office/powerpoint/2010/main" val="1883753473"/>
+        <p14:creationId xmlns:p14="http://schemas.microsoft.com/office/powerpoint/2010/main" val="2497079415"/>
       </p:ext>
     </p:extLst>
   </p:cSld>
   <p:clrMapOvr>
     <a:masterClrMapping/>
   </p:clrMapOvr>
-  <p:timing>
-    <p:tnLst>
-      <p:par>
-        <p:cTn id="1" dur="indefinite" restart="never" nodeType="tmRoot">
-          <p:childTnLst>
-            <p:seq concurrent="1" nextAc="seek">
-              <p:cTn id="2" dur="indefinite" nodeType="mainSeq">
-                <p:childTnLst>
-                  <p:par>
-                    <p:cTn id="3" fill="hold">
-                      <p:stCondLst>
-                        <p:cond delay="indefinite"/>
-                      </p:stCondLst>
-                      <p:childTnLst>
-                        <p:par>
-                          <p:cTn id="4" fill="hold">
-                            <p:stCondLst>
-                              <p:cond delay="0"/>
-                            </p:stCondLst>
-                            <p:childTnLst>
-                              <p:par>
-                                <p:cTn id="5" presetID="1" presetClass="entr" presetSubtype="0" fill="hold" nodeType="clickEffect">
-                                  <p:stCondLst>
-                                    <p:cond delay="0"/>
-                                  </p:stCondLst>
-                                  <p:childTnLst>
-                                    <p:set>
-                                      <p:cBhvr>
-                                        <p:cTn id="6" dur="1" fill="hold">
-                                          <p:stCondLst>
-                                            <p:cond delay="0"/>
-                                          </p:stCondLst>
-                                        </p:cTn>
-                                        <p:tgtEl>
-                                          <p:spTgt spid="2">
-                                            <p:txEl>
-                                              <p:pRg st="2" end="2"/>
-                                            </p:txEl>
-                                          </p:spTgt>
-                                        </p:tgtEl>
-                                        <p:attrNameLst>
-                                          <p:attrName>style.visibility</p:attrName>
-                                        </p:attrNameLst>
-                                      </p:cBhvr>
-                                      <p:to>
-                                        <p:strVal val="visible"/>
-                                      </p:to>
-                                    </p:set>
-                                  </p:childTnLst>
-                                </p:cTn>
-                              </p:par>
-                              <p:par>
-                                <p:cTn id="7" presetID="1" presetClass="entr" presetSubtype="0" fill="hold" nodeType="withEffect">
-                                  <p:stCondLst>
-                                    <p:cond delay="0"/>
-                                  </p:stCondLst>
-                                  <p:childTnLst>
-                                    <p:set>
-                                      <p:cBhvr>
-                                        <p:cTn id="8" dur="1" fill="hold">
-                                          <p:stCondLst>
-                                            <p:cond delay="0"/>
-                                          </p:stCondLst>
-                                        </p:cTn>
-                                        <p:tgtEl>
-                                          <p:spTgt spid="2">
-                                            <p:txEl>
-                                              <p:pRg st="4" end="4"/>
-                                            </p:txEl>
-                                          </p:spTgt>
-                                        </p:tgtEl>
-                                        <p:attrNameLst>
-                                          <p:attrName>style.visibility</p:attrName>
-                                        </p:attrNameLst>
-                                      </p:cBhvr>
-                                      <p:to>
-                                        <p:strVal val="visible"/>
-                                      </p:to>
-                                    </p:set>
-                                  </p:childTnLst>
-                                </p:cTn>
-                              </p:par>
-                            </p:childTnLst>
-                          </p:cTn>
-                        </p:par>
-                      </p:childTnLst>
-                    </p:cTn>
-                  </p:par>
-                </p:childTnLst>
-              </p:cTn>
-              <p:prevCondLst>
-                <p:cond evt="onPrev" delay="0">
-                  <p:tgtEl>
-                    <p:sldTgt/>
-                  </p:tgtEl>
-                </p:cond>
-              </p:prevCondLst>
-              <p:nextCondLst>
-                <p:cond evt="onNext" delay="0">
-                  <p:tgtEl>
-                    <p:sldTgt/>
-                  </p:tgtEl>
-                </p:cond>
-              </p:nextCondLst>
-            </p:seq>
-          </p:childTnLst>
-        </p:cTn>
-      </p:par>
-    </p:tnLst>
-  </p:timing>
 </p:sld>
 </file>
 
@@ -25509,23 +27387,7 @@
                   <a:srgbClr val="E46102"/>
                 </a:solidFill>
               </a:rPr>
-              <a:t>Discussion: </a:t>
-            </a:r>
-            <a:r>
-              <a:rPr lang="en-US" sz="4000" b="1" dirty="0" err="1">
-                <a:solidFill>
-                  <a:srgbClr val="E46102"/>
-                </a:solidFill>
-              </a:rPr>
-              <a:t>kNN</a:t>
-            </a:r>
-            <a:r>
-              <a:rPr lang="en-US" sz="4000" b="1" dirty="0">
-                <a:solidFill>
-                  <a:srgbClr val="E46102"/>
-                </a:solidFill>
-              </a:rPr>
-              <a:t> (Bias vs Variance)</a:t>
+              <a:t>Example Exercise</a:t>
             </a:r>
             <a:endParaRPr sz="4000" b="1" dirty="0">
               <a:solidFill>
@@ -25549,8 +27411,8 @@
         </p:nvSpPr>
         <p:spPr>
           <a:xfrm>
-            <a:off x="982327" y="1672944"/>
-            <a:ext cx="10359866" cy="3539430"/>
+            <a:off x="717173" y="2459944"/>
+            <a:ext cx="10972800" cy="2246769"/>
           </a:xfrm>
           <a:prstGeom prst="rect">
             <a:avLst/>
@@ -25563,44 +27425,38 @@
           </a:bodyPr>
           <a:lstStyle/>
           <a:p>
-            <a:r>
-              <a:rPr lang="en-US" sz="2800" dirty="0"/>
-              <a:t>Compared to simpler (fewer parameters), complex models have what kind of Bias and Variance?:</a:t>
-            </a:r>
-          </a:p>
-          <a:p>
-            <a:endParaRPr lang="en-US" sz="2800" b="1" dirty="0"/>
-          </a:p>
-          <a:p>
-            <a:r>
-              <a:rPr lang="en-US" sz="2800" b="1" dirty="0"/>
-              <a:t>Bias: </a:t>
-            </a:r>
-            <a:r>
-              <a:rPr lang="en-US" sz="2800" dirty="0"/>
-              <a:t>Lower, because complex models can better model local variation. </a:t>
-            </a:r>
-            <a:endParaRPr lang="en-US" sz="2800" b="1" dirty="0"/>
-          </a:p>
-          <a:p>
-            <a:endParaRPr lang="en-US" sz="2800" b="1" dirty="0"/>
-          </a:p>
-          <a:p>
-            <a:r>
-              <a:rPr lang="en-US" sz="2800" b="1" dirty="0" err="1"/>
-              <a:t>Variance:</a:t>
-            </a:r>
-            <a:r>
-              <a:rPr lang="en-US" sz="2800" b="1" dirty="0" err="1">
+            <a:pPr algn="ctr"/>
+            <a:r>
+              <a:rPr lang="en-US" sz="2000" b="0" i="0" dirty="0">
                 <a:solidFill>
-                  <a:srgbClr val="C00000"/>
+                  <a:srgbClr val="242424"/>
                 </a:solidFill>
+                <a:effectLst/>
+                <a:latin typeface="source-serif-pro"/>
               </a:rPr>
-              <a:t>Higher</a:t>
-            </a:r>
-            <a:r>
-              <a:rPr lang="en-US" sz="2800" dirty="0"/>
-              <a:t>, because the parameters are generally more sensitive to few data values. </a:t>
+              <a:t>The training data will be perfectly predicted, right? The bias will be 0 when K=1, however, when it comes to new data (in test set), it has higher chance to be an error, which causes high variance. </a:t>
+            </a:r>
+          </a:p>
+          <a:p>
+            <a:pPr algn="ctr"/>
+            <a:endParaRPr lang="en-US" sz="2000" dirty="0">
+              <a:solidFill>
+                <a:srgbClr val="242424"/>
+              </a:solidFill>
+              <a:latin typeface="source-serif-pro"/>
+            </a:endParaRPr>
+          </a:p>
+          <a:p>
+            <a:pPr algn="ctr"/>
+            <a:r>
+              <a:rPr lang="en-US" sz="2000" b="0" i="0" dirty="0">
+                <a:solidFill>
+                  <a:srgbClr val="242424"/>
+                </a:solidFill>
+                <a:effectLst/>
+                <a:latin typeface="source-serif-pro"/>
+              </a:rPr>
+              <a:t>When we increase K, the training error will increase (increase bias), but the test error may decrease at the same time (decrease variance). We can think that when K becomes larger, since it has to consider more neighbors, its model is more complex. Now we can split the data into training and validation set and decide what K should be like.</a:t>
             </a:r>
           </a:p>
         </p:txBody>
@@ -25608,123 +27464,13 @@
     </p:spTree>
     <p:extLst>
       <p:ext uri="{BB962C8B-B14F-4D97-AF65-F5344CB8AC3E}">
-        <p14:creationId xmlns:p14="http://schemas.microsoft.com/office/powerpoint/2010/main" val="4155287407"/>
+        <p14:creationId xmlns:p14="http://schemas.microsoft.com/office/powerpoint/2010/main" val="1707805880"/>
       </p:ext>
     </p:extLst>
   </p:cSld>
   <p:clrMapOvr>
     <a:masterClrMapping/>
   </p:clrMapOvr>
-  <p:timing>
-    <p:tnLst>
-      <p:par>
-        <p:cTn id="1" dur="indefinite" restart="never" nodeType="tmRoot">
-          <p:childTnLst>
-            <p:seq concurrent="1" nextAc="seek">
-              <p:cTn id="2" dur="indefinite" nodeType="mainSeq">
-                <p:childTnLst>
-                  <p:par>
-                    <p:cTn id="3" fill="hold">
-                      <p:stCondLst>
-                        <p:cond delay="indefinite"/>
-                      </p:stCondLst>
-                      <p:childTnLst>
-                        <p:par>
-                          <p:cTn id="4" fill="hold">
-                            <p:stCondLst>
-                              <p:cond delay="0"/>
-                            </p:stCondLst>
-                            <p:childTnLst>
-                              <p:par>
-                                <p:cTn id="5" presetID="1" presetClass="entr" presetSubtype="0" fill="hold" nodeType="clickEffect">
-                                  <p:stCondLst>
-                                    <p:cond delay="0"/>
-                                  </p:stCondLst>
-                                  <p:childTnLst>
-                                    <p:set>
-                                      <p:cBhvr>
-                                        <p:cTn id="6" dur="1" fill="hold">
-                                          <p:stCondLst>
-                                            <p:cond delay="0"/>
-                                          </p:stCondLst>
-                                        </p:cTn>
-                                        <p:tgtEl>
-                                          <p:spTgt spid="2">
-                                            <p:txEl>
-                                              <p:pRg st="2" end="2"/>
-                                            </p:txEl>
-                                          </p:spTgt>
-                                        </p:tgtEl>
-                                        <p:attrNameLst>
-                                          <p:attrName>style.visibility</p:attrName>
-                                        </p:attrNameLst>
-                                      </p:cBhvr>
-                                      <p:to>
-                                        <p:strVal val="visible"/>
-                                      </p:to>
-                                    </p:set>
-                                  </p:childTnLst>
-                                </p:cTn>
-                              </p:par>
-                              <p:par>
-                                <p:cTn id="7" presetID="1" presetClass="entr" presetSubtype="0" fill="hold" nodeType="withEffect">
-                                  <p:stCondLst>
-                                    <p:cond delay="0"/>
-                                  </p:stCondLst>
-                                  <p:childTnLst>
-                                    <p:set>
-                                      <p:cBhvr>
-                                        <p:cTn id="8" dur="1" fill="hold">
-                                          <p:stCondLst>
-                                            <p:cond delay="0"/>
-                                          </p:stCondLst>
-                                        </p:cTn>
-                                        <p:tgtEl>
-                                          <p:spTgt spid="2">
-                                            <p:txEl>
-                                              <p:pRg st="4" end="4"/>
-                                            </p:txEl>
-                                          </p:spTgt>
-                                        </p:tgtEl>
-                                        <p:attrNameLst>
-                                          <p:attrName>style.visibility</p:attrName>
-                                        </p:attrNameLst>
-                                      </p:cBhvr>
-                                      <p:to>
-                                        <p:strVal val="visible"/>
-                                      </p:to>
-                                    </p:set>
-                                  </p:childTnLst>
-                                </p:cTn>
-                              </p:par>
-                            </p:childTnLst>
-                          </p:cTn>
-                        </p:par>
-                      </p:childTnLst>
-                    </p:cTn>
-                  </p:par>
-                </p:childTnLst>
-              </p:cTn>
-              <p:prevCondLst>
-                <p:cond evt="onPrev" delay="0">
-                  <p:tgtEl>
-                    <p:sldTgt/>
-                  </p:tgtEl>
-                </p:cond>
-              </p:prevCondLst>
-              <p:nextCondLst>
-                <p:cond evt="onNext" delay="0">
-                  <p:tgtEl>
-                    <p:sldTgt/>
-                  </p:tgtEl>
-                </p:cond>
-              </p:nextCondLst>
-            </p:seq>
-          </p:childTnLst>
-        </p:cTn>
-      </p:par>
-    </p:tnLst>
-  </p:timing>
 </p:sld>
 </file>
 
@@ -26988,202 +28734,6 @@
     <p:extLst>
       <p:ext uri="{BB962C8B-B14F-4D97-AF65-F5344CB8AC3E}">
         <p14:creationId xmlns:p14="http://schemas.microsoft.com/office/powerpoint/2010/main" val="2860784599"/>
-      </p:ext>
-    </p:extLst>
-  </p:cSld>
-  <p:clrMapOvr>
-    <a:masterClrMapping/>
-  </p:clrMapOvr>
-</p:sld>
-</file>
-
-<file path=ppt/slides/slide40.xml><?xml version="1.0" encoding="utf-8"?>
-<p:sld xmlns:a="http://schemas.openxmlformats.org/drawingml/2006/main" xmlns:r="http://schemas.openxmlformats.org/officeDocument/2006/relationships" xmlns:p="http://schemas.openxmlformats.org/presentationml/2006/main">
-  <p:cSld>
-    <p:spTree>
-      <p:nvGrpSpPr>
-        <p:cNvPr id="1" name="Shape 94"/>
-        <p:cNvGrpSpPr/>
-        <p:nvPr/>
-      </p:nvGrpSpPr>
-      <p:grpSpPr>
-        <a:xfrm>
-          <a:off x="0" y="0"/>
-          <a:ext cx="0" cy="0"/>
-          <a:chOff x="0" y="0"/>
-          <a:chExt cx="0" cy="0"/>
-        </a:xfrm>
-      </p:grpSpPr>
-      <p:sp>
-        <p:nvSpPr>
-          <p:cNvPr id="95" name="Google Shape;95;p14"/>
-          <p:cNvSpPr txBox="1">
-            <a:spLocks noGrp="1"/>
-          </p:cNvSpPr>
-          <p:nvPr>
-            <p:ph type="title" idx="4294967295"/>
-          </p:nvPr>
-        </p:nvSpPr>
-        <p:spPr>
-          <a:xfrm>
-            <a:off x="717173" y="696913"/>
-            <a:ext cx="10972800" cy="506789"/>
-          </a:xfrm>
-          <a:prstGeom prst="rect">
-            <a:avLst/>
-          </a:prstGeom>
-        </p:spPr>
-        <p:txBody>
-          <a:bodyPr spcFirstLastPara="1" wrap="square" lIns="121900" tIns="121900" rIns="121900" bIns="121900" anchor="ctr" anchorCtr="0">
-            <a:noAutofit/>
-          </a:bodyPr>
-          <a:lstStyle/>
-          <a:p>
-            <a:r>
-              <a:rPr lang="en-US" sz="4000" b="1" dirty="0">
-                <a:solidFill>
-                  <a:srgbClr val="E46102"/>
-                </a:solidFill>
-              </a:rPr>
-              <a:t>Discussion: </a:t>
-            </a:r>
-            <a:r>
-              <a:rPr lang="en-US" sz="4000" b="1" dirty="0" err="1">
-                <a:solidFill>
-                  <a:srgbClr val="E46102"/>
-                </a:solidFill>
-              </a:rPr>
-              <a:t>kNN</a:t>
-            </a:r>
-            <a:r>
-              <a:rPr lang="en-US" sz="4000" b="1" dirty="0">
-                <a:solidFill>
-                  <a:srgbClr val="E46102"/>
-                </a:solidFill>
-              </a:rPr>
-              <a:t> (Bias vs Variance)</a:t>
-            </a:r>
-            <a:endParaRPr sz="4000" b="1" dirty="0">
-              <a:solidFill>
-                <a:srgbClr val="E46102"/>
-              </a:solidFill>
-            </a:endParaRPr>
-          </a:p>
-        </p:txBody>
-      </p:sp>
-      <p:sp>
-        <p:nvSpPr>
-          <p:cNvPr id="2" name="TextBox 1">
-            <a:extLst>
-              <a:ext uri="{FF2B5EF4-FFF2-40B4-BE49-F238E27FC236}">
-                <a16:creationId xmlns:a16="http://schemas.microsoft.com/office/drawing/2014/main" id="{3A5DBC26-7440-4310-878C-EABC6AE57D06}"/>
-              </a:ext>
-            </a:extLst>
-          </p:cNvPr>
-          <p:cNvSpPr txBox="1"/>
-          <p:nvPr/>
-        </p:nvSpPr>
-        <p:spPr>
-          <a:xfrm>
-            <a:off x="717173" y="1874728"/>
-            <a:ext cx="10972800" cy="3108543"/>
-          </a:xfrm>
-          <a:prstGeom prst="rect">
-            <a:avLst/>
-          </a:prstGeom>
-          <a:noFill/>
-        </p:spPr>
-        <p:txBody>
-          <a:bodyPr wrap="square" rtlCol="0">
-            <a:spAutoFit/>
-          </a:bodyPr>
-          <a:lstStyle/>
-          <a:p>
-            <a:r>
-              <a:rPr lang="en-US" sz="2800" dirty="0"/>
-              <a:t>What is the best </a:t>
-            </a:r>
-            <a:r>
-              <a:rPr lang="en-US" sz="2800" b="1" dirty="0"/>
-              <a:t>distance</a:t>
-            </a:r>
-            <a:r>
-              <a:rPr lang="en-US" sz="2800" dirty="0"/>
-              <a:t> to use?</a:t>
-            </a:r>
-          </a:p>
-          <a:p>
-            <a:r>
-              <a:rPr lang="en-US" sz="2800" dirty="0"/>
-              <a:t>What is the best value of </a:t>
-            </a:r>
-            <a:r>
-              <a:rPr lang="en-US" sz="2800" b="1" dirty="0"/>
-              <a:t>k</a:t>
-            </a:r>
-            <a:r>
-              <a:rPr lang="en-US" sz="2800" dirty="0"/>
-              <a:t> to use?</a:t>
-            </a:r>
-          </a:p>
-          <a:p>
-            <a:endParaRPr lang="en-US" sz="2800" dirty="0"/>
-          </a:p>
-          <a:p>
-            <a:r>
-              <a:rPr lang="en-US" sz="2800" dirty="0"/>
-              <a:t>i.e. how do we set the </a:t>
-            </a:r>
-            <a:r>
-              <a:rPr lang="en-US" sz="2800" b="1" dirty="0"/>
-              <a:t>hyperparameters</a:t>
-            </a:r>
-            <a:r>
-              <a:rPr lang="en-US" sz="2800" dirty="0"/>
-              <a:t>?</a:t>
-            </a:r>
-          </a:p>
-          <a:p>
-            <a:endParaRPr lang="en-US" sz="2800" dirty="0"/>
-          </a:p>
-          <a:p>
-            <a:pPr>
-              <a:buClr>
-                <a:schemeClr val="dk1"/>
-              </a:buClr>
-              <a:buSzPct val="45833"/>
-            </a:pPr>
-            <a:r>
-              <a:rPr lang="en-US" sz="2800" dirty="0">
-                <a:solidFill>
-                  <a:srgbClr val="38761D"/>
-                </a:solidFill>
-              </a:rPr>
-              <a:t>Very problem-dependent. </a:t>
-            </a:r>
-          </a:p>
-          <a:p>
-            <a:pPr>
-              <a:buClr>
-                <a:schemeClr val="dk1"/>
-              </a:buClr>
-              <a:buSzPct val="45833"/>
-            </a:pPr>
-            <a:r>
-              <a:rPr lang="en-US" sz="2800" dirty="0">
-                <a:solidFill>
-                  <a:srgbClr val="38761D"/>
-                </a:solidFill>
-              </a:rPr>
-              <a:t>Must try them all out and see what works best.</a:t>
-            </a:r>
-          </a:p>
-        </p:txBody>
-      </p:sp>
-    </p:spTree>
-    <p:extLst>
-      <p:ext uri="{BB962C8B-B14F-4D97-AF65-F5344CB8AC3E}">
-        <p14:creationId xmlns:p14="http://schemas.microsoft.com/office/powerpoint/2010/main" val="2606690237"/>
       </p:ext>
     </p:extLst>
   </p:cSld>

</xml_diff>